<commit_message>
qlq slides de plus et mise à jour
</commit_message>
<xml_diff>
--- a/Etude_donnes.pptx
+++ b/Etude_donnes.pptx
@@ -6,17 +6,24 @@
   </p:sldMasterIdLst>
   <p:sldIdLst>
     <p:sldId id="256" r:id="rId2"/>
-    <p:sldId id="267" r:id="rId3"/>
-    <p:sldId id="266" r:id="rId4"/>
-    <p:sldId id="269" r:id="rId5"/>
-    <p:sldId id="268" r:id="rId6"/>
-    <p:sldId id="264" r:id="rId7"/>
-    <p:sldId id="258" r:id="rId8"/>
-    <p:sldId id="260" r:id="rId9"/>
-    <p:sldId id="265" r:id="rId10"/>
-    <p:sldId id="272" r:id="rId11"/>
-    <p:sldId id="271" r:id="rId12"/>
-    <p:sldId id="263" r:id="rId13"/>
+    <p:sldId id="273" r:id="rId3"/>
+    <p:sldId id="267" r:id="rId4"/>
+    <p:sldId id="274" r:id="rId5"/>
+    <p:sldId id="266" r:id="rId6"/>
+    <p:sldId id="269" r:id="rId7"/>
+    <p:sldId id="268" r:id="rId8"/>
+    <p:sldId id="264" r:id="rId9"/>
+    <p:sldId id="258" r:id="rId10"/>
+    <p:sldId id="260" r:id="rId11"/>
+    <p:sldId id="265" r:id="rId12"/>
+    <p:sldId id="272" r:id="rId13"/>
+    <p:sldId id="271" r:id="rId14"/>
+    <p:sldId id="263" r:id="rId15"/>
+    <p:sldId id="279" r:id="rId16"/>
+    <p:sldId id="280" r:id="rId17"/>
+    <p:sldId id="276" r:id="rId18"/>
+    <p:sldId id="278" r:id="rId19"/>
+    <p:sldId id="277" r:id="rId20"/>
   </p:sldIdLst>
   <p:sldSz cx="12192000" cy="6858000"/>
   <p:notesSz cx="6858000" cy="9144000"/>
@@ -115,6 +122,11 @@
       </a:defRPr>
     </a:lvl9pPr>
   </p:defaultTextStyle>
+  <p:extLst>
+    <p:ext uri="{EFAFB233-063F-42B5-8137-9DF3F51BA10A}">
+      <p15:sldGuideLst xmlns:p15="http://schemas.microsoft.com/office/powerpoint/2012/main"/>
+    </p:ext>
+  </p:extLst>
 </p:presentation>
 </file>
 
@@ -289,7 +301,7 @@
           <a:p>
             <a:fld id="{B8969A60-FE3D-4891-B0DA-0BFC16FEAED1}" type="datetimeFigureOut">
               <a:rPr lang="en-GB" smtClean="0"/>
-              <a:t>04/05/2021</a:t>
+              <a:t>09/05/2021</a:t>
             </a:fld>
             <a:endParaRPr lang="en-GB"/>
           </a:p>
@@ -601,7 +613,7 @@
           <a:p>
             <a:fld id="{B8969A60-FE3D-4891-B0DA-0BFC16FEAED1}" type="datetimeFigureOut">
               <a:rPr lang="en-GB" smtClean="0"/>
-              <a:t>04/05/2021</a:t>
+              <a:t>09/05/2021</a:t>
             </a:fld>
             <a:endParaRPr lang="en-GB"/>
           </a:p>
@@ -823,7 +835,7 @@
           <a:p>
             <a:fld id="{B8969A60-FE3D-4891-B0DA-0BFC16FEAED1}" type="datetimeFigureOut">
               <a:rPr lang="en-GB" smtClean="0"/>
-              <a:t>04/05/2021</a:t>
+              <a:t>09/05/2021</a:t>
             </a:fld>
             <a:endParaRPr lang="en-GB"/>
           </a:p>
@@ -1114,7 +1126,7 @@
           <a:p>
             <a:fld id="{B8969A60-FE3D-4891-B0DA-0BFC16FEAED1}" type="datetimeFigureOut">
               <a:rPr lang="en-GB" smtClean="0"/>
-              <a:t>04/05/2021</a:t>
+              <a:t>09/05/2021</a:t>
             </a:fld>
             <a:endParaRPr lang="en-GB"/>
           </a:p>
@@ -1568,7 +1580,7 @@
           <a:p>
             <a:fld id="{B8969A60-FE3D-4891-B0DA-0BFC16FEAED1}" type="datetimeFigureOut">
               <a:rPr lang="en-GB" smtClean="0"/>
-              <a:t>04/05/2021</a:t>
+              <a:t>09/05/2021</a:t>
             </a:fld>
             <a:endParaRPr lang="en-GB"/>
           </a:p>
@@ -2144,7 +2156,7 @@
           <a:p>
             <a:fld id="{B8969A60-FE3D-4891-B0DA-0BFC16FEAED1}" type="datetimeFigureOut">
               <a:rPr lang="en-GB" smtClean="0"/>
-              <a:t>04/05/2021</a:t>
+              <a:t>09/05/2021</a:t>
             </a:fld>
             <a:endParaRPr lang="en-GB"/>
           </a:p>
@@ -2996,7 +3008,7 @@
           <a:p>
             <a:fld id="{B8969A60-FE3D-4891-B0DA-0BFC16FEAED1}" type="datetimeFigureOut">
               <a:rPr lang="en-GB" smtClean="0"/>
-              <a:t>04/05/2021</a:t>
+              <a:t>09/05/2021</a:t>
             </a:fld>
             <a:endParaRPr lang="en-GB"/>
           </a:p>
@@ -3201,7 +3213,7 @@
           <a:p>
             <a:fld id="{B8969A60-FE3D-4891-B0DA-0BFC16FEAED1}" type="datetimeFigureOut">
               <a:rPr lang="en-GB" smtClean="0"/>
-              <a:t>04/05/2021</a:t>
+              <a:t>09/05/2021</a:t>
             </a:fld>
             <a:endParaRPr lang="en-GB"/>
           </a:p>
@@ -3415,7 +3427,7 @@
           <a:p>
             <a:fld id="{B8969A60-FE3D-4891-B0DA-0BFC16FEAED1}" type="datetimeFigureOut">
               <a:rPr lang="en-GB" smtClean="0"/>
-              <a:t>04/05/2021</a:t>
+              <a:t>09/05/2021</a:t>
             </a:fld>
             <a:endParaRPr lang="en-GB"/>
           </a:p>
@@ -3620,7 +3632,7 @@
           <a:p>
             <a:fld id="{B8969A60-FE3D-4891-B0DA-0BFC16FEAED1}" type="datetimeFigureOut">
               <a:rPr lang="en-GB" smtClean="0"/>
-              <a:t>04/05/2021</a:t>
+              <a:t>09/05/2021</a:t>
             </a:fld>
             <a:endParaRPr lang="en-GB"/>
           </a:p>
@@ -3900,7 +3912,7 @@
           <a:p>
             <a:fld id="{B8969A60-FE3D-4891-B0DA-0BFC16FEAED1}" type="datetimeFigureOut">
               <a:rPr lang="en-GB" smtClean="0"/>
-              <a:t>04/05/2021</a:t>
+              <a:t>09/05/2021</a:t>
             </a:fld>
             <a:endParaRPr lang="en-GB"/>
           </a:p>
@@ -4167,7 +4179,7 @@
           <a:p>
             <a:fld id="{B8969A60-FE3D-4891-B0DA-0BFC16FEAED1}" type="datetimeFigureOut">
               <a:rPr lang="en-GB" smtClean="0"/>
-              <a:t>04/05/2021</a:t>
+              <a:t>09/05/2021</a:t>
             </a:fld>
             <a:endParaRPr lang="en-GB"/>
           </a:p>
@@ -4582,7 +4594,7 @@
           <a:p>
             <a:fld id="{B8969A60-FE3D-4891-B0DA-0BFC16FEAED1}" type="datetimeFigureOut">
               <a:rPr lang="en-GB" smtClean="0"/>
-              <a:t>04/05/2021</a:t>
+              <a:t>09/05/2021</a:t>
             </a:fld>
             <a:endParaRPr lang="en-GB"/>
           </a:p>
@@ -4730,7 +4742,7 @@
           <a:p>
             <a:fld id="{B8969A60-FE3D-4891-B0DA-0BFC16FEAED1}" type="datetimeFigureOut">
               <a:rPr lang="en-GB" smtClean="0"/>
-              <a:t>04/05/2021</a:t>
+              <a:t>09/05/2021</a:t>
             </a:fld>
             <a:endParaRPr lang="en-GB"/>
           </a:p>
@@ -4855,7 +4867,7 @@
           <a:p>
             <a:fld id="{B8969A60-FE3D-4891-B0DA-0BFC16FEAED1}" type="datetimeFigureOut">
               <a:rPr lang="en-GB" smtClean="0"/>
-              <a:t>04/05/2021</a:t>
+              <a:t>09/05/2021</a:t>
             </a:fld>
             <a:endParaRPr lang="en-GB"/>
           </a:p>
@@ -5134,7 +5146,7 @@
           <a:p>
             <a:fld id="{B8969A60-FE3D-4891-B0DA-0BFC16FEAED1}" type="datetimeFigureOut">
               <a:rPr lang="en-GB" smtClean="0"/>
-              <a:t>04/05/2021</a:t>
+              <a:t>09/05/2021</a:t>
             </a:fld>
             <a:endParaRPr lang="en-GB"/>
           </a:p>
@@ -5446,7 +5458,7 @@
           <a:p>
             <a:fld id="{B8969A60-FE3D-4891-B0DA-0BFC16FEAED1}" type="datetimeFigureOut">
               <a:rPr lang="en-GB" smtClean="0"/>
-              <a:t>04/05/2021</a:t>
+              <a:t>09/05/2021</a:t>
             </a:fld>
             <a:endParaRPr lang="en-GB"/>
           </a:p>
@@ -5699,7 +5711,7 @@
           <a:p>
             <a:fld id="{B8969A60-FE3D-4891-B0DA-0BFC16FEAED1}" type="datetimeFigureOut">
               <a:rPr lang="en-GB" smtClean="0"/>
-              <a:t>04/05/2021</a:t>
+              <a:t>09/05/2021</a:t>
             </a:fld>
             <a:endParaRPr lang="en-GB"/>
           </a:p>
@@ -6211,59 +6223,9 @@
           <a:chExt cx="0" cy="0"/>
         </a:xfrm>
       </p:grpSpPr>
-      <p:sp>
-        <p:nvSpPr>
-          <p:cNvPr id="3" name="Titre 1"/>
-          <p:cNvSpPr txBox="1">
-            <a:spLocks/>
-          </p:cNvSpPr>
-          <p:nvPr/>
-        </p:nvSpPr>
-        <p:spPr>
-          <a:xfrm>
-            <a:off x="153379" y="5852160"/>
-            <a:ext cx="10364451" cy="1290669"/>
-          </a:xfrm>
-          <a:prstGeom prst="rect">
-            <a:avLst/>
-          </a:prstGeom>
-        </p:spPr>
-        <p:txBody>
-          <a:bodyPr>
-            <a:normAutofit/>
-          </a:bodyPr>
-          <a:lstStyle>
-            <a:lvl1pPr algn="ctr" defTabSz="914400" rtl="0" eaLnBrk="1" latinLnBrk="0" hangingPunct="1">
-              <a:lnSpc>
-                <a:spcPct val="90000"/>
-              </a:lnSpc>
-              <a:spcBef>
-                <a:spcPct val="0"/>
-              </a:spcBef>
-              <a:buNone/>
-              <a:defRPr sz="3600" kern="1200" cap="all" baseline="0">
-                <a:solidFill>
-                  <a:schemeClr val="tx1"/>
-                </a:solidFill>
-                <a:effectLst/>
-                <a:latin typeface="+mj-lt"/>
-                <a:ea typeface="+mj-ea"/>
-                <a:cs typeface="+mj-cs"/>
-              </a:defRPr>
-            </a:lvl1pPr>
-          </a:lstStyle>
-          <a:p>
-            <a:pPr algn="l"/>
-            <a:endParaRPr lang="en-GB" sz="1400" dirty="0">
-              <a:latin typeface="Times New Roman" panose="02020603050405020304" pitchFamily="18" charset="0"/>
-              <a:cs typeface="Times New Roman" panose="02020603050405020304" pitchFamily="18" charset="0"/>
-            </a:endParaRPr>
-          </a:p>
-        </p:txBody>
-      </p:sp>
       <p:pic>
         <p:nvPicPr>
-          <p:cNvPr id="5" name="Image 4" descr="Capture d’écran"/>
+          <p:cNvPr id="2" name="Image 1" descr="Capture d’écran"/>
           <p:cNvPicPr>
             <a:picLocks noChangeAspect="1"/>
           </p:cNvPicPr>
@@ -6284,7 +6246,7 @@
         <p:spPr>
           <a:xfrm>
             <a:off x="0" y="0"/>
-            <a:ext cx="12192000" cy="5755907"/>
+            <a:ext cx="12192000" cy="5473981"/>
           </a:xfrm>
           <a:prstGeom prst="rect">
             <a:avLst/>
@@ -6293,14 +6255,14 @@
       </p:pic>
       <p:sp>
         <p:nvSpPr>
-          <p:cNvPr id="6" name="Rectangle à coins arrondis 5"/>
+          <p:cNvPr id="4" name="Rectangle à coins arrondis 3"/>
           <p:cNvSpPr/>
           <p:nvPr/>
         </p:nvSpPr>
         <p:spPr>
           <a:xfrm>
-            <a:off x="1619956" y="5936822"/>
-            <a:ext cx="8952089" cy="406399"/>
+            <a:off x="400756" y="5743814"/>
+            <a:ext cx="11390489" cy="854541"/>
           </a:xfrm>
           <a:prstGeom prst="roundRect">
             <a:avLst/>
@@ -6337,7 +6299,24 @@
                 <a:latin typeface="Times New Roman" panose="02020603050405020304" pitchFamily="18" charset="0"/>
                 <a:cs typeface="Times New Roman" panose="02020603050405020304" pitchFamily="18" charset="0"/>
               </a:rPr>
-              <a:t>Grande majorité de casses pour les faibles diamètres inférieures à 15528mm posés entre 1951-1983</a:t>
+              <a:t>Grande majorité de casses de FONTEDUCTILE et PVC déposés entre 1967-1983</a:t>
+            </a:r>
+          </a:p>
+          <a:p>
+            <a:r>
+              <a:rPr lang="fr-FR" sz="1600" dirty="0" smtClean="0">
+                <a:latin typeface="Times New Roman" panose="02020603050405020304" pitchFamily="18" charset="0"/>
+                <a:cs typeface="Times New Roman" panose="02020603050405020304" pitchFamily="18" charset="0"/>
+                <a:sym typeface="Wingdings" panose="05000000000000000000" pitchFamily="2" charset="2"/>
+              </a:rPr>
+              <a:t> </a:t>
+            </a:r>
+            <a:r>
+              <a:rPr lang="fr-FR" sz="1600" dirty="0" smtClean="0">
+                <a:latin typeface="Times New Roman" panose="02020603050405020304" pitchFamily="18" charset="0"/>
+                <a:cs typeface="Times New Roman" panose="02020603050405020304" pitchFamily="18" charset="0"/>
+              </a:rPr>
+              <a:t>Grande majorité de FONTEGRISE déposés entre 1951-1967</a:t>
             </a:r>
             <a:endParaRPr lang="en-GB" sz="1600" dirty="0">
               <a:latin typeface="Times New Roman" panose="02020603050405020304" pitchFamily="18" charset="0"/>
@@ -6349,7 +6328,7 @@
     </p:spTree>
     <p:extLst>
       <p:ext uri="{BB962C8B-B14F-4D97-AF65-F5344CB8AC3E}">
-        <p14:creationId xmlns:p14="http://schemas.microsoft.com/office/powerpoint/2010/main" val="3547218202"/>
+        <p14:creationId xmlns:p14="http://schemas.microsoft.com/office/powerpoint/2010/main" val="1133595337"/>
       </p:ext>
     </p:extLst>
   </p:cSld>
@@ -6399,7 +6378,7 @@
         <p:spPr>
           <a:xfrm>
             <a:off x="0" y="0"/>
-            <a:ext cx="12192000" cy="5207267"/>
+            <a:ext cx="12192000" cy="5607338"/>
           </a:xfrm>
           <a:prstGeom prst="rect">
             <a:avLst/>
@@ -6408,14 +6387,82 @@
       </p:pic>
       <p:sp>
         <p:nvSpPr>
-          <p:cNvPr id="3" name="Rectangle à coins arrondis 2"/>
+          <p:cNvPr id="4" name="Rectangle à coins arrondis 3"/>
           <p:cNvSpPr/>
           <p:nvPr/>
         </p:nvSpPr>
         <p:spPr>
           <a:xfrm>
-            <a:off x="1254197" y="5648064"/>
-            <a:ext cx="9516473" cy="608357"/>
+            <a:off x="1106905" y="5488795"/>
+            <a:ext cx="9606013" cy="310871"/>
+          </a:xfrm>
+          <a:prstGeom prst="roundRect">
+            <a:avLst/>
+          </a:prstGeom>
+          <a:noFill/>
+          <a:ln>
+            <a:noFill/>
+          </a:ln>
+        </p:spPr>
+        <p:style>
+          <a:lnRef idx="1">
+            <a:schemeClr val="accent6"/>
+          </a:lnRef>
+          <a:fillRef idx="3">
+            <a:schemeClr val="accent6"/>
+          </a:fillRef>
+          <a:effectRef idx="2">
+            <a:schemeClr val="accent6"/>
+          </a:effectRef>
+          <a:fontRef idx="minor">
+            <a:schemeClr val="lt1"/>
+          </a:fontRef>
+        </p:style>
+        <p:txBody>
+          <a:bodyPr rtlCol="0" anchor="ctr"/>
+          <a:lstStyle/>
+          <a:p>
+            <a:pPr algn="ctr"/>
+            <a:r>
+              <a:rPr lang="fr-FR" sz="1600" dirty="0" smtClean="0">
+                <a:solidFill>
+                  <a:schemeClr val="tx1"/>
+                </a:solidFill>
+                <a:latin typeface="Times New Roman" panose="02020603050405020304" pitchFamily="18" charset="0"/>
+                <a:cs typeface="Times New Roman" panose="02020603050405020304" pitchFamily="18" charset="0"/>
+              </a:rPr>
+              <a:t>En prenant en compte de </a:t>
+            </a:r>
+            <a:r>
+              <a:rPr lang="fr-FR" sz="1600" dirty="0" smtClean="0">
+                <a:solidFill>
+                  <a:srgbClr val="FF0000"/>
+                </a:solidFill>
+                <a:latin typeface="Times New Roman" panose="02020603050405020304" pitchFamily="18" charset="0"/>
+                <a:cs typeface="Times New Roman" panose="02020603050405020304" pitchFamily="18" charset="0"/>
+              </a:rPr>
+              <a:t>nombre total des tuyaux (sachant que 151 tuyaux qui ne sont pas pris en compte):</a:t>
+            </a:r>
+            <a:endParaRPr lang="en-GB" sz="1600" dirty="0">
+              <a:solidFill>
+                <a:srgbClr val="FF0000"/>
+              </a:solidFill>
+              <a:latin typeface="Times New Roman" panose="02020603050405020304" pitchFamily="18" charset="0"/>
+              <a:cs typeface="Times New Roman" panose="02020603050405020304" pitchFamily="18" charset="0"/>
+            </a:endParaRPr>
+          </a:p>
+        </p:txBody>
+      </p:sp>
+      <p:sp>
+        <p:nvSpPr>
+          <p:cNvPr id="5" name="Rectangle à coins arrondis 4"/>
+          <p:cNvSpPr/>
+          <p:nvPr/>
+        </p:nvSpPr>
+        <p:spPr>
+          <a:xfrm>
+            <a:off x="152400" y="5830711"/>
+            <a:ext cx="5254978" cy="1027289"/>
           </a:xfrm>
           <a:prstGeom prst="roundRect">
             <a:avLst/>
@@ -6443,9 +6490,109 @@
               <a:rPr lang="fr-FR" sz="1600" dirty="0" smtClean="0">
                 <a:latin typeface="Times New Roman" panose="02020603050405020304" pitchFamily="18" charset="0"/>
                 <a:cs typeface="Times New Roman" panose="02020603050405020304" pitchFamily="18" charset="0"/>
-                <a:sym typeface="Wingdings" panose="05000000000000000000" pitchFamily="2" charset="2"/>
               </a:rPr>
-              <a:t>Il y a 43 catégorie de diamètre des tuyaux installés qui ne sont pas cassés (peut être manque d’information)</a:t>
+              <a:t>Peu fiable:</a:t>
+            </a:r>
+          </a:p>
+          <a:p>
+            <a:pPr marL="285750" indent="-285750">
+              <a:buFontTx/>
+              <a:buChar char="-"/>
+            </a:pPr>
+            <a:r>
+              <a:rPr lang="fr-FR" sz="1600" dirty="0" smtClean="0">
+                <a:latin typeface="Times New Roman" panose="02020603050405020304" pitchFamily="18" charset="0"/>
+                <a:cs typeface="Times New Roman" panose="02020603050405020304" pitchFamily="18" charset="0"/>
+              </a:rPr>
+              <a:t>Acier posé entre 1927-2001, </a:t>
+            </a:r>
+          </a:p>
+          <a:p>
+            <a:pPr marL="285750" indent="-285750">
+              <a:buFontTx/>
+              <a:buChar char="-"/>
+            </a:pPr>
+            <a:r>
+              <a:rPr lang="fr-FR" sz="1600" dirty="0" smtClean="0">
+                <a:latin typeface="Times New Roman" panose="02020603050405020304" pitchFamily="18" charset="0"/>
+                <a:cs typeface="Times New Roman" panose="02020603050405020304" pitchFamily="18" charset="0"/>
+              </a:rPr>
+              <a:t>PEBD posé entre 1956-1984, </a:t>
+            </a:r>
+          </a:p>
+          <a:p>
+            <a:pPr marL="285750" indent="-285750">
+              <a:buFontTx/>
+              <a:buChar char="-"/>
+            </a:pPr>
+            <a:r>
+              <a:rPr lang="fr-FR" sz="1600" dirty="0" smtClean="0">
+                <a:latin typeface="Times New Roman" panose="02020603050405020304" pitchFamily="18" charset="0"/>
+                <a:cs typeface="Times New Roman" panose="02020603050405020304" pitchFamily="18" charset="0"/>
+              </a:rPr>
+              <a:t>FONTEGRISE quelque soit l'année de pose</a:t>
+            </a:r>
+            <a:endParaRPr lang="fr-FR" sz="1600" dirty="0">
+              <a:latin typeface="Times New Roman" panose="02020603050405020304" pitchFamily="18" charset="0"/>
+              <a:cs typeface="Times New Roman" panose="02020603050405020304" pitchFamily="18" charset="0"/>
+            </a:endParaRPr>
+          </a:p>
+        </p:txBody>
+      </p:sp>
+      <p:sp>
+        <p:nvSpPr>
+          <p:cNvPr id="6" name="Rectangle à coins arrondis 5"/>
+          <p:cNvSpPr/>
+          <p:nvPr/>
+        </p:nvSpPr>
+        <p:spPr>
+          <a:xfrm>
+            <a:off x="6214534" y="5799666"/>
+            <a:ext cx="5875867" cy="1078089"/>
+          </a:xfrm>
+          <a:prstGeom prst="roundRect">
+            <a:avLst/>
+          </a:prstGeom>
+        </p:spPr>
+        <p:style>
+          <a:lnRef idx="2">
+            <a:schemeClr val="dk1"/>
+          </a:lnRef>
+          <a:fillRef idx="1">
+            <a:schemeClr val="lt1"/>
+          </a:fillRef>
+          <a:effectRef idx="0">
+            <a:schemeClr val="dk1"/>
+          </a:effectRef>
+          <a:fontRef idx="minor">
+            <a:schemeClr val="dk1"/>
+          </a:fontRef>
+        </p:style>
+        <p:txBody>
+          <a:bodyPr rtlCol="0" anchor="ctr"/>
+          <a:lstStyle/>
+          <a:p>
+            <a:r>
+              <a:rPr lang="fr-FR" sz="1600" dirty="0" smtClean="0">
+                <a:latin typeface="Times New Roman" panose="02020603050405020304" pitchFamily="18" charset="0"/>
+                <a:cs typeface="Times New Roman" panose="02020603050405020304" pitchFamily="18" charset="0"/>
+              </a:rPr>
+              <a:t>Assez fiable:</a:t>
+            </a:r>
+          </a:p>
+          <a:p>
+            <a:endParaRPr lang="fr-FR" sz="1600" dirty="0" smtClean="0">
+              <a:latin typeface="Times New Roman" panose="02020603050405020304" pitchFamily="18" charset="0"/>
+              <a:cs typeface="Times New Roman" panose="02020603050405020304" pitchFamily="18" charset="0"/>
+            </a:endParaRPr>
+          </a:p>
+          <a:p>
+            <a:r>
+              <a:rPr lang="fr-FR" sz="1600" dirty="0" smtClean="0">
+                <a:latin typeface="Times New Roman" panose="02020603050405020304" pitchFamily="18" charset="0"/>
+                <a:cs typeface="Times New Roman" panose="02020603050405020304" pitchFamily="18" charset="0"/>
+              </a:rPr>
+              <a:t>- Plomb (11% des tuyaux posés en 1950).</a:t>
             </a:r>
             <a:endParaRPr lang="en-GB" sz="1600" dirty="0">
               <a:latin typeface="Times New Roman" panose="02020603050405020304" pitchFamily="18" charset="0"/>
@@ -6454,65 +6601,10 @@
           </a:p>
         </p:txBody>
       </p:sp>
-      <p:sp>
-        <p:nvSpPr>
-          <p:cNvPr id="4" name="Rectangle à coins arrondis 3"/>
-          <p:cNvSpPr/>
-          <p:nvPr/>
-        </p:nvSpPr>
-        <p:spPr>
-          <a:xfrm>
-            <a:off x="2884311" y="6497494"/>
-            <a:ext cx="5875867" cy="375781"/>
-          </a:xfrm>
-          <a:prstGeom prst="roundRect">
-            <a:avLst/>
-          </a:prstGeom>
-          <a:ln/>
-        </p:spPr>
-        <p:style>
-          <a:lnRef idx="1">
-            <a:schemeClr val="accent5"/>
-          </a:lnRef>
-          <a:fillRef idx="3">
-            <a:schemeClr val="accent5"/>
-          </a:fillRef>
-          <a:effectRef idx="2">
-            <a:schemeClr val="accent5"/>
-          </a:effectRef>
-          <a:fontRef idx="minor">
-            <a:schemeClr val="lt1"/>
-          </a:fontRef>
-        </p:style>
-        <p:txBody>
-          <a:bodyPr rtlCol="0" anchor="ctr"/>
-          <a:lstStyle/>
-          <a:p>
-            <a:pPr algn="ctr"/>
-            <a:r>
-              <a:rPr lang="fr-FR" sz="1600" dirty="0" smtClean="0">
-                <a:solidFill>
-                  <a:schemeClr val="tx1"/>
-                </a:solidFill>
-                <a:latin typeface="Times New Roman" panose="02020603050405020304" pitchFamily="18" charset="0"/>
-                <a:cs typeface="Times New Roman" panose="02020603050405020304" pitchFamily="18" charset="0"/>
-              </a:rPr>
-              <a:t>L’étude suivante est effectuées sur des diamètres &lt; 20000 mm</a:t>
-            </a:r>
-            <a:endParaRPr lang="en-GB" sz="1600" dirty="0">
-              <a:solidFill>
-                <a:srgbClr val="FF0000"/>
-              </a:solidFill>
-              <a:latin typeface="Times New Roman" panose="02020603050405020304" pitchFamily="18" charset="0"/>
-              <a:cs typeface="Times New Roman" panose="02020603050405020304" pitchFamily="18" charset="0"/>
-            </a:endParaRPr>
-          </a:p>
-        </p:txBody>
-      </p:sp>
     </p:spTree>
     <p:extLst>
       <p:ext uri="{BB962C8B-B14F-4D97-AF65-F5344CB8AC3E}">
-        <p14:creationId xmlns:p14="http://schemas.microsoft.com/office/powerpoint/2010/main" val="645284941"/>
+        <p14:creationId xmlns:p14="http://schemas.microsoft.com/office/powerpoint/2010/main" val="1389165174"/>
       </p:ext>
     </p:extLst>
   </p:cSld>
@@ -6523,6 +6615,171 @@
 </file>
 
 <file path=ppt/slides/slide12.xml><?xml version="1.0" encoding="utf-8"?>
+<p:sld xmlns:a="http://schemas.openxmlformats.org/drawingml/2006/main" xmlns:r="http://schemas.openxmlformats.org/officeDocument/2006/relationships" xmlns:p="http://schemas.openxmlformats.org/presentationml/2006/main">
+  <p:cSld>
+    <p:spTree>
+      <p:nvGrpSpPr>
+        <p:cNvPr id="1" name=""/>
+        <p:cNvGrpSpPr/>
+        <p:nvPr/>
+      </p:nvGrpSpPr>
+      <p:grpSpPr>
+        <a:xfrm>
+          <a:off x="0" y="0"/>
+          <a:ext cx="0" cy="0"/>
+          <a:chOff x="0" y="0"/>
+          <a:chExt cx="0" cy="0"/>
+        </a:xfrm>
+      </p:grpSpPr>
+      <p:sp>
+        <p:nvSpPr>
+          <p:cNvPr id="3" name="Titre 1"/>
+          <p:cNvSpPr txBox="1">
+            <a:spLocks/>
+          </p:cNvSpPr>
+          <p:nvPr/>
+        </p:nvSpPr>
+        <p:spPr>
+          <a:xfrm>
+            <a:off x="153379" y="5852160"/>
+            <a:ext cx="10364451" cy="1290669"/>
+          </a:xfrm>
+          <a:prstGeom prst="rect">
+            <a:avLst/>
+          </a:prstGeom>
+        </p:spPr>
+        <p:txBody>
+          <a:bodyPr>
+            <a:normAutofit/>
+          </a:bodyPr>
+          <a:lstStyle>
+            <a:lvl1pPr algn="ctr" defTabSz="914400" rtl="0" eaLnBrk="1" latinLnBrk="0" hangingPunct="1">
+              <a:lnSpc>
+                <a:spcPct val="90000"/>
+              </a:lnSpc>
+              <a:spcBef>
+                <a:spcPct val="0"/>
+              </a:spcBef>
+              <a:buNone/>
+              <a:defRPr sz="3600" kern="1200" cap="all" baseline="0">
+                <a:solidFill>
+                  <a:schemeClr val="tx1"/>
+                </a:solidFill>
+                <a:effectLst/>
+                <a:latin typeface="+mj-lt"/>
+                <a:ea typeface="+mj-ea"/>
+                <a:cs typeface="+mj-cs"/>
+              </a:defRPr>
+            </a:lvl1pPr>
+          </a:lstStyle>
+          <a:p>
+            <a:pPr algn="l"/>
+            <a:endParaRPr lang="en-GB" sz="1400" dirty="0">
+              <a:latin typeface="Times New Roman" panose="02020603050405020304" pitchFamily="18" charset="0"/>
+              <a:cs typeface="Times New Roman" panose="02020603050405020304" pitchFamily="18" charset="0"/>
+            </a:endParaRPr>
+          </a:p>
+        </p:txBody>
+      </p:sp>
+      <p:pic>
+        <p:nvPicPr>
+          <p:cNvPr id="5" name="Image 4" descr="Capture d’écran"/>
+          <p:cNvPicPr>
+            <a:picLocks noChangeAspect="1"/>
+          </p:cNvPicPr>
+          <p:nvPr/>
+        </p:nvPicPr>
+        <p:blipFill>
+          <a:blip r:embed="rId2">
+            <a:extLst>
+              <a:ext uri="{28A0092B-C50C-407E-A947-70E740481C1C}">
+                <a14:useLocalDpi xmlns:a14="http://schemas.microsoft.com/office/drawing/2010/main" val="0"/>
+              </a:ext>
+            </a:extLst>
+          </a:blip>
+          <a:stretch>
+            <a:fillRect/>
+          </a:stretch>
+        </p:blipFill>
+        <p:spPr>
+          <a:xfrm>
+            <a:off x="0" y="0"/>
+            <a:ext cx="12192000" cy="5755907"/>
+          </a:xfrm>
+          <a:prstGeom prst="rect">
+            <a:avLst/>
+          </a:prstGeom>
+        </p:spPr>
+      </p:pic>
+      <p:sp>
+        <p:nvSpPr>
+          <p:cNvPr id="6" name="Rectangle à coins arrondis 5"/>
+          <p:cNvSpPr/>
+          <p:nvPr/>
+        </p:nvSpPr>
+        <p:spPr>
+          <a:xfrm>
+            <a:off x="1619956" y="5936822"/>
+            <a:ext cx="8952089" cy="406399"/>
+          </a:xfrm>
+          <a:prstGeom prst="roundRect">
+            <a:avLst/>
+          </a:prstGeom>
+        </p:spPr>
+        <p:style>
+          <a:lnRef idx="2">
+            <a:schemeClr val="dk1"/>
+          </a:lnRef>
+          <a:fillRef idx="1">
+            <a:schemeClr val="lt1"/>
+          </a:fillRef>
+          <a:effectRef idx="0">
+            <a:schemeClr val="dk1"/>
+          </a:effectRef>
+          <a:fontRef idx="minor">
+            <a:schemeClr val="dk1"/>
+          </a:fontRef>
+        </p:style>
+        <p:txBody>
+          <a:bodyPr rtlCol="0" anchor="ctr"/>
+          <a:lstStyle/>
+          <a:p>
+            <a:r>
+              <a:rPr lang="fr-FR" sz="1600" dirty="0" smtClean="0">
+                <a:latin typeface="Times New Roman" panose="02020603050405020304" pitchFamily="18" charset="0"/>
+                <a:cs typeface="Times New Roman" panose="02020603050405020304" pitchFamily="18" charset="0"/>
+                <a:sym typeface="Wingdings" panose="05000000000000000000" pitchFamily="2" charset="2"/>
+              </a:rPr>
+              <a:t> </a:t>
+            </a:r>
+            <a:r>
+              <a:rPr lang="fr-FR" sz="1600" dirty="0" smtClean="0">
+                <a:latin typeface="Times New Roman" panose="02020603050405020304" pitchFamily="18" charset="0"/>
+                <a:cs typeface="Times New Roman" panose="02020603050405020304" pitchFamily="18" charset="0"/>
+              </a:rPr>
+              <a:t>Grande majorité de casses pour les faibles diamètres inférieures à 15528mm posés entre 1951-1983</a:t>
+            </a:r>
+            <a:endParaRPr lang="en-GB" sz="1600" dirty="0">
+              <a:latin typeface="Times New Roman" panose="02020603050405020304" pitchFamily="18" charset="0"/>
+              <a:cs typeface="Times New Roman" panose="02020603050405020304" pitchFamily="18" charset="0"/>
+            </a:endParaRPr>
+          </a:p>
+        </p:txBody>
+      </p:sp>
+    </p:spTree>
+    <p:extLst>
+      <p:ext uri="{BB962C8B-B14F-4D97-AF65-F5344CB8AC3E}">
+        <p14:creationId xmlns:p14="http://schemas.microsoft.com/office/powerpoint/2010/main" val="3547218202"/>
+      </p:ext>
+    </p:extLst>
+  </p:cSld>
+  <p:clrMapOvr>
+    <a:masterClrMapping/>
+  </p:clrMapOvr>
+</p:sld>
+</file>
+
+<file path=ppt/slides/slide13.xml><?xml version="1.0" encoding="utf-8"?>
 <p:sld xmlns:a="http://schemas.openxmlformats.org/drawingml/2006/main" xmlns:r="http://schemas.openxmlformats.org/officeDocument/2006/relationships" xmlns:p="http://schemas.openxmlformats.org/presentationml/2006/main">
   <p:cSld>
     <p:spTree>
@@ -6562,7 +6819,7 @@
         <p:spPr>
           <a:xfrm>
             <a:off x="0" y="0"/>
-            <a:ext cx="12192000" cy="5588287"/>
+            <a:ext cx="12192000" cy="5207267"/>
           </a:xfrm>
           <a:prstGeom prst="rect">
             <a:avLst/>
@@ -6571,64 +6828,14 @@
       </p:pic>
       <p:sp>
         <p:nvSpPr>
-          <p:cNvPr id="3" name="Titre 1"/>
-          <p:cNvSpPr txBox="1">
-            <a:spLocks/>
-          </p:cNvSpPr>
-          <p:nvPr/>
-        </p:nvSpPr>
-        <p:spPr>
-          <a:xfrm>
-            <a:off x="0" y="5567331"/>
-            <a:ext cx="10364451" cy="1290669"/>
-          </a:xfrm>
-          <a:prstGeom prst="rect">
-            <a:avLst/>
-          </a:prstGeom>
-        </p:spPr>
-        <p:txBody>
-          <a:bodyPr>
-            <a:normAutofit/>
-          </a:bodyPr>
-          <a:lstStyle>
-            <a:lvl1pPr algn="ctr" defTabSz="914400" rtl="0" eaLnBrk="1" latinLnBrk="0" hangingPunct="1">
-              <a:lnSpc>
-                <a:spcPct val="90000"/>
-              </a:lnSpc>
-              <a:spcBef>
-                <a:spcPct val="0"/>
-              </a:spcBef>
-              <a:buNone/>
-              <a:defRPr sz="3600" kern="1200" cap="all" baseline="0">
-                <a:solidFill>
-                  <a:schemeClr val="tx1"/>
-                </a:solidFill>
-                <a:effectLst/>
-                <a:latin typeface="+mj-lt"/>
-                <a:ea typeface="+mj-ea"/>
-                <a:cs typeface="+mj-cs"/>
-              </a:defRPr>
-            </a:lvl1pPr>
-          </a:lstStyle>
-          <a:p>
-            <a:pPr algn="l"/>
-            <a:endParaRPr lang="en-GB" sz="1400" dirty="0">
-              <a:latin typeface="Times New Roman" panose="02020603050405020304" pitchFamily="18" charset="0"/>
-              <a:cs typeface="Times New Roman" panose="02020603050405020304" pitchFamily="18" charset="0"/>
-            </a:endParaRPr>
-          </a:p>
-        </p:txBody>
-      </p:sp>
-      <p:sp>
-        <p:nvSpPr>
-          <p:cNvPr id="4" name="Rectangle à coins arrondis 3"/>
+          <p:cNvPr id="3" name="Rectangle à coins arrondis 2"/>
           <p:cNvSpPr/>
           <p:nvPr/>
         </p:nvSpPr>
         <p:spPr>
           <a:xfrm>
-            <a:off x="2952044" y="6165929"/>
-            <a:ext cx="6287912" cy="427270"/>
+            <a:off x="1254197" y="5648064"/>
+            <a:ext cx="9516473" cy="608357"/>
           </a:xfrm>
           <a:prstGeom prst="roundRect">
             <a:avLst/>
@@ -6658,16 +6865,9 @@
                 <a:cs typeface="Times New Roman" panose="02020603050405020304" pitchFamily="18" charset="0"/>
                 <a:sym typeface="Wingdings" panose="05000000000000000000" pitchFamily="2" charset="2"/>
               </a:rPr>
-              <a:t></a:t>
-            </a:r>
-            <a:r>
-              <a:rPr lang="fr-FR" sz="1600" dirty="0" smtClean="0">
-                <a:latin typeface="Times New Roman" panose="02020603050405020304" pitchFamily="18" charset="0"/>
-                <a:cs typeface="Times New Roman" panose="02020603050405020304" pitchFamily="18" charset="0"/>
-              </a:rPr>
-              <a:t>ACIER, FONTEGRISE et PEHD sont très peu fiables à faible diamètre</a:t>
-            </a:r>
-            <a:endParaRPr lang="en-GB" sz="1600" dirty="0" smtClean="0">
+              <a:t>Il y a 43 catégorie de diamètre des tuyaux installés qui ne sont pas cassés (peut être manque d’information)</a:t>
+            </a:r>
+            <a:endParaRPr lang="en-GB" sz="1600" dirty="0">
               <a:latin typeface="Times New Roman" panose="02020603050405020304" pitchFamily="18" charset="0"/>
               <a:cs typeface="Times New Roman" panose="02020603050405020304" pitchFamily="18" charset="0"/>
             </a:endParaRPr>
@@ -6676,32 +6876,29 @@
       </p:sp>
       <p:sp>
         <p:nvSpPr>
-          <p:cNvPr id="5" name="Rectangle à coins arrondis 4"/>
+          <p:cNvPr id="4" name="Rectangle à coins arrondis 3"/>
           <p:cNvSpPr/>
           <p:nvPr/>
         </p:nvSpPr>
         <p:spPr>
           <a:xfrm>
-            <a:off x="3081867" y="5659472"/>
+            <a:off x="2884311" y="6497494"/>
             <a:ext cx="5875867" cy="375781"/>
           </a:xfrm>
           <a:prstGeom prst="roundRect">
             <a:avLst/>
           </a:prstGeom>
-          <a:noFill/>
-          <a:ln>
-            <a:noFill/>
-          </a:ln>
+          <a:ln/>
         </p:spPr>
         <p:style>
           <a:lnRef idx="1">
-            <a:schemeClr val="accent6"/>
+            <a:schemeClr val="accent5"/>
           </a:lnRef>
           <a:fillRef idx="3">
-            <a:schemeClr val="accent6"/>
+            <a:schemeClr val="accent5"/>
           </a:fillRef>
           <a:effectRef idx="2">
-            <a:schemeClr val="accent6"/>
+            <a:schemeClr val="accent5"/>
           </a:effectRef>
           <a:fontRef idx="minor">
             <a:schemeClr val="lt1"/>
@@ -6720,17 +6917,7 @@
                 <a:latin typeface="Times New Roman" panose="02020603050405020304" pitchFamily="18" charset="0"/>
                 <a:cs typeface="Times New Roman" panose="02020603050405020304" pitchFamily="18" charset="0"/>
               </a:rPr>
-              <a:t>En prenant en compte de </a:t>
-            </a:r>
-            <a:r>
-              <a:rPr lang="fr-FR" sz="1600" dirty="0" smtClean="0">
-                <a:solidFill>
-                  <a:srgbClr val="FF0000"/>
-                </a:solidFill>
-                <a:latin typeface="Times New Roman" panose="02020603050405020304" pitchFamily="18" charset="0"/>
-                <a:cs typeface="Times New Roman" panose="02020603050405020304" pitchFamily="18" charset="0"/>
-              </a:rPr>
-              <a:t>nombre total des tuyaux:</a:t>
+              <a:t>L’étude suivante est effectuées sur des diamètres &lt; 20000 mm</a:t>
             </a:r>
             <a:endParaRPr lang="en-GB" sz="1600" dirty="0">
               <a:solidFill>
@@ -6742,58 +6929,10 @@
           </a:p>
         </p:txBody>
       </p:sp>
-      <p:sp>
-        <p:nvSpPr>
-          <p:cNvPr id="6" name="Rectangle à coins arrondis 5"/>
-          <p:cNvSpPr/>
-          <p:nvPr/>
-        </p:nvSpPr>
-        <p:spPr>
-          <a:xfrm>
-            <a:off x="2543982" y="1326321"/>
-            <a:ext cx="9516473" cy="608357"/>
-          </a:xfrm>
-          <a:prstGeom prst="roundRect">
-            <a:avLst/>
-          </a:prstGeom>
-        </p:spPr>
-        <p:style>
-          <a:lnRef idx="2">
-            <a:schemeClr val="dk1"/>
-          </a:lnRef>
-          <a:fillRef idx="1">
-            <a:schemeClr val="lt1"/>
-          </a:fillRef>
-          <a:effectRef idx="0">
-            <a:schemeClr val="dk1"/>
-          </a:effectRef>
-          <a:fontRef idx="minor">
-            <a:schemeClr val="dk1"/>
-          </a:fontRef>
-        </p:style>
-        <p:txBody>
-          <a:bodyPr rtlCol="0" anchor="ctr"/>
-          <a:lstStyle/>
-          <a:p>
-            <a:r>
-              <a:rPr lang="fr-FR" sz="1600" dirty="0" smtClean="0">
-                <a:latin typeface="Times New Roman" panose="02020603050405020304" pitchFamily="18" charset="0"/>
-                <a:cs typeface="Times New Roman" panose="02020603050405020304" pitchFamily="18" charset="0"/>
-                <a:sym typeface="Wingdings" panose="05000000000000000000" pitchFamily="2" charset="2"/>
-              </a:rPr>
-              <a:t>170 catégorie de diamètre des tuyaux installés pour chaque matériaux qui ne sont pas cassés (peut être manque d’information)</a:t>
-            </a:r>
-            <a:endParaRPr lang="en-GB" sz="1600" dirty="0">
-              <a:latin typeface="Times New Roman" panose="02020603050405020304" pitchFamily="18" charset="0"/>
-              <a:cs typeface="Times New Roman" panose="02020603050405020304" pitchFamily="18" charset="0"/>
-            </a:endParaRPr>
-          </a:p>
-        </p:txBody>
-      </p:sp>
     </p:spTree>
     <p:extLst>
       <p:ext uri="{BB962C8B-B14F-4D97-AF65-F5344CB8AC3E}">
-        <p14:creationId xmlns:p14="http://schemas.microsoft.com/office/powerpoint/2010/main" val="1934597613"/>
+        <p14:creationId xmlns:p14="http://schemas.microsoft.com/office/powerpoint/2010/main" val="645284941"/>
       </p:ext>
     </p:extLst>
   </p:cSld>
@@ -6803,513 +6942,7 @@
 </p:sld>
 </file>
 
-<file path=ppt/slides/slide2.xml><?xml version="1.0" encoding="utf-8"?>
-<p:sld xmlns:a="http://schemas.openxmlformats.org/drawingml/2006/main" xmlns:r="http://schemas.openxmlformats.org/officeDocument/2006/relationships" xmlns:p="http://schemas.openxmlformats.org/presentationml/2006/main">
-  <p:cSld>
-    <p:spTree>
-      <p:nvGrpSpPr>
-        <p:cNvPr id="1" name=""/>
-        <p:cNvGrpSpPr/>
-        <p:nvPr/>
-      </p:nvGrpSpPr>
-      <p:grpSpPr>
-        <a:xfrm>
-          <a:off x="0" y="0"/>
-          <a:ext cx="0" cy="0"/>
-          <a:chOff x="0" y="0"/>
-          <a:chExt cx="0" cy="0"/>
-        </a:xfrm>
-      </p:grpSpPr>
-      <p:sp>
-        <p:nvSpPr>
-          <p:cNvPr id="2" name="Rectangle à coins arrondis 1"/>
-          <p:cNvSpPr/>
-          <p:nvPr/>
-        </p:nvSpPr>
-        <p:spPr>
-          <a:xfrm>
-            <a:off x="197555" y="677334"/>
-            <a:ext cx="11390489" cy="5904087"/>
-          </a:xfrm>
-          <a:prstGeom prst="roundRect">
-            <a:avLst/>
-          </a:prstGeom>
-        </p:spPr>
-        <p:style>
-          <a:lnRef idx="2">
-            <a:schemeClr val="dk1"/>
-          </a:lnRef>
-          <a:fillRef idx="1">
-            <a:schemeClr val="lt1"/>
-          </a:fillRef>
-          <a:effectRef idx="0">
-            <a:schemeClr val="dk1"/>
-          </a:effectRef>
-          <a:fontRef idx="minor">
-            <a:schemeClr val="dk1"/>
-          </a:fontRef>
-        </p:style>
-        <p:txBody>
-          <a:bodyPr rtlCol="0" anchor="ctr"/>
-          <a:lstStyle/>
-          <a:p>
-            <a:r>
-              <a:rPr lang="fr-FR" sz="1600" dirty="0" smtClean="0">
-                <a:latin typeface="Times New Roman" panose="02020603050405020304" pitchFamily="18" charset="0"/>
-                <a:cs typeface="Times New Roman" panose="02020603050405020304" pitchFamily="18" charset="0"/>
-              </a:rPr>
-              <a:t>1/ Etude globale des données fournies pour avoir une idée sur les principaux composants d’un réseau d’eau.</a:t>
-            </a:r>
-          </a:p>
-          <a:p>
-            <a:r>
-              <a:rPr lang="fr-FR" sz="1600" dirty="0" smtClean="0">
-                <a:latin typeface="Times New Roman" panose="02020603050405020304" pitchFamily="18" charset="0"/>
-                <a:cs typeface="Times New Roman" panose="02020603050405020304" pitchFamily="18" charset="0"/>
-              </a:rPr>
-              <a:t>2/ (4-6) Etude qualitative qui permet de détecter les matériaux qui ont subit plus de casses, avec une étude normalisée qui permet de détecter les matages et les matériaux les plus risqués.</a:t>
-            </a:r>
-          </a:p>
-          <a:p>
-            <a:r>
-              <a:rPr lang="fr-FR" sz="1600" dirty="0" smtClean="0">
-                <a:latin typeface="Times New Roman" panose="02020603050405020304" pitchFamily="18" charset="0"/>
-                <a:cs typeface="Times New Roman" panose="02020603050405020304" pitchFamily="18" charset="0"/>
-              </a:rPr>
-              <a:t>3/ (7) Etude qualitative qui permet de détecter les collectivités les plus touchées et les matages les plus risqués dans ces collectivités.</a:t>
-            </a:r>
-          </a:p>
-          <a:p>
-            <a:r>
-              <a:rPr lang="fr-FR" sz="1600" dirty="0" smtClean="0">
-                <a:latin typeface="Times New Roman" panose="02020603050405020304" pitchFamily="18" charset="0"/>
-                <a:cs typeface="Times New Roman" panose="02020603050405020304" pitchFamily="18" charset="0"/>
-              </a:rPr>
-              <a:t>4/ (8) Etude quantitative qui permet de détecter les matages les plus risqués  en fonction de l’année de pose.</a:t>
-            </a:r>
-          </a:p>
-          <a:p>
-            <a:r>
-              <a:rPr lang="fr-FR" sz="1600" dirty="0" smtClean="0">
-                <a:latin typeface="Times New Roman" panose="02020603050405020304" pitchFamily="18" charset="0"/>
-                <a:cs typeface="Times New Roman" panose="02020603050405020304" pitchFamily="18" charset="0"/>
-              </a:rPr>
-              <a:t>5/ (9) Etude quantitative normalisée qui permet de détecter les</a:t>
-            </a:r>
-            <a:r>
-              <a:rPr lang="fr-FR" sz="1600" dirty="0" smtClean="0">
-                <a:latin typeface="Times New Roman" panose="02020603050405020304" pitchFamily="18" charset="0"/>
-                <a:cs typeface="Times New Roman" panose="02020603050405020304" pitchFamily="18" charset="0"/>
-              </a:rPr>
-              <a:t> années </a:t>
-            </a:r>
-            <a:r>
-              <a:rPr lang="fr-FR" sz="1600" smtClean="0">
-                <a:latin typeface="Times New Roman" panose="02020603050405020304" pitchFamily="18" charset="0"/>
-                <a:cs typeface="Times New Roman" panose="02020603050405020304" pitchFamily="18" charset="0"/>
-              </a:rPr>
-              <a:t>de pose …????</a:t>
-            </a:r>
-            <a:endParaRPr lang="fr-FR" sz="1600" dirty="0" smtClean="0">
-              <a:latin typeface="Times New Roman" panose="02020603050405020304" pitchFamily="18" charset="0"/>
-              <a:cs typeface="Times New Roman" panose="02020603050405020304" pitchFamily="18" charset="0"/>
-            </a:endParaRPr>
-          </a:p>
-          <a:p>
-            <a:endParaRPr lang="fr-FR" sz="1600" dirty="0" smtClean="0">
-              <a:latin typeface="Times New Roman" panose="02020603050405020304" pitchFamily="18" charset="0"/>
-              <a:cs typeface="Times New Roman" panose="02020603050405020304" pitchFamily="18" charset="0"/>
-            </a:endParaRPr>
-          </a:p>
-          <a:p>
-            <a:r>
-              <a:rPr lang="fr-FR" sz="1600" dirty="0" smtClean="0">
-                <a:latin typeface="Times New Roman" panose="02020603050405020304" pitchFamily="18" charset="0"/>
-                <a:cs typeface="Times New Roman" panose="02020603050405020304" pitchFamily="18" charset="0"/>
-              </a:rPr>
-              <a:t>6/(10) Etude quantitative qui permet de détecter les diamètres qui ont subit plus de casses</a:t>
-            </a:r>
-          </a:p>
-          <a:p>
-            <a:r>
-              <a:rPr lang="fr-FR" sz="1600" dirty="0" smtClean="0">
-                <a:latin typeface="Times New Roman" panose="02020603050405020304" pitchFamily="18" charset="0"/>
-                <a:cs typeface="Times New Roman" panose="02020603050405020304" pitchFamily="18" charset="0"/>
-              </a:rPr>
-              <a:t>7/ (11) Etude quantitative normalisée qui permet d’identifier les diamètre les moins fiables</a:t>
-            </a:r>
-          </a:p>
-          <a:p>
-            <a:r>
-              <a:rPr lang="fr-FR" sz="1600" dirty="0" smtClean="0">
-                <a:latin typeface="Times New Roman" panose="02020603050405020304" pitchFamily="18" charset="0"/>
-                <a:cs typeface="Times New Roman" panose="02020603050405020304" pitchFamily="18" charset="0"/>
-              </a:rPr>
-              <a:t>8/ </a:t>
-            </a:r>
-            <a:r>
-              <a:rPr lang="fr-FR" sz="1600" dirty="0" smtClean="0">
-                <a:latin typeface="Times New Roman" panose="02020603050405020304" pitchFamily="18" charset="0"/>
-                <a:cs typeface="Times New Roman" panose="02020603050405020304" pitchFamily="18" charset="0"/>
-              </a:rPr>
-              <a:t>(12) Etude quantitative normalisée qui permet d’identifier les diamètre les moins fiables pour chaque matériau</a:t>
-            </a:r>
-          </a:p>
-        </p:txBody>
-      </p:sp>
-    </p:spTree>
-    <p:extLst>
-      <p:ext uri="{BB962C8B-B14F-4D97-AF65-F5344CB8AC3E}">
-        <p14:creationId xmlns:p14="http://schemas.microsoft.com/office/powerpoint/2010/main" val="622630890"/>
-      </p:ext>
-    </p:extLst>
-  </p:cSld>
-  <p:clrMapOvr>
-    <a:masterClrMapping/>
-  </p:clrMapOvr>
-</p:sld>
-</file>
-
-<file path=ppt/slides/slide3.xml><?xml version="1.0" encoding="utf-8"?>
-<p:sld xmlns:a="http://schemas.openxmlformats.org/drawingml/2006/main" xmlns:r="http://schemas.openxmlformats.org/officeDocument/2006/relationships" xmlns:p="http://schemas.openxmlformats.org/presentationml/2006/main">
-  <p:cSld>
-    <p:spTree>
-      <p:nvGrpSpPr>
-        <p:cNvPr id="1" name=""/>
-        <p:cNvGrpSpPr/>
-        <p:nvPr/>
-      </p:nvGrpSpPr>
-      <p:grpSpPr>
-        <a:xfrm>
-          <a:off x="0" y="0"/>
-          <a:ext cx="0" cy="0"/>
-          <a:chOff x="0" y="0"/>
-          <a:chExt cx="0" cy="0"/>
-        </a:xfrm>
-      </p:grpSpPr>
-      <p:sp>
-        <p:nvSpPr>
-          <p:cNvPr id="3" name="Rectangle à coins arrondis 2"/>
-          <p:cNvSpPr/>
-          <p:nvPr/>
-        </p:nvSpPr>
-        <p:spPr>
-          <a:xfrm>
-            <a:off x="400755" y="5520268"/>
-            <a:ext cx="11390489" cy="1196622"/>
-          </a:xfrm>
-          <a:prstGeom prst="roundRect">
-            <a:avLst/>
-          </a:prstGeom>
-        </p:spPr>
-        <p:style>
-          <a:lnRef idx="2">
-            <a:schemeClr val="dk1"/>
-          </a:lnRef>
-          <a:fillRef idx="1">
-            <a:schemeClr val="lt1"/>
-          </a:fillRef>
-          <a:effectRef idx="0">
-            <a:schemeClr val="dk1"/>
-          </a:effectRef>
-          <a:fontRef idx="minor">
-            <a:schemeClr val="dk1"/>
-          </a:fontRef>
-        </p:style>
-        <p:txBody>
-          <a:bodyPr rtlCol="0" anchor="ctr"/>
-          <a:lstStyle/>
-          <a:p>
-            <a:pPr marL="285750" indent="-285750">
-              <a:buFont typeface="Wingdings" panose="05000000000000000000" pitchFamily="2" charset="2"/>
-              <a:buChar char="à"/>
-            </a:pPr>
-            <a:r>
-              <a:rPr lang="fr-FR" sz="1600" dirty="0" smtClean="0">
-                <a:latin typeface="Times New Roman" panose="02020603050405020304" pitchFamily="18" charset="0"/>
-                <a:cs typeface="Times New Roman" panose="02020603050405020304" pitchFamily="18" charset="0"/>
-              </a:rPr>
-              <a:t>Les matériaux dominants dans les réseaux d’eau sont: le FONTEDUCTIBLE, FONTEGRISE, PVC et PEHD</a:t>
-            </a:r>
-          </a:p>
-          <a:p>
-            <a:pPr marL="285750" indent="-285750">
-              <a:buFont typeface="Wingdings" panose="05000000000000000000" pitchFamily="2" charset="2"/>
-              <a:buChar char="à"/>
-            </a:pPr>
-            <a:r>
-              <a:rPr lang="fr-FR" sz="1600" dirty="0" smtClean="0">
-                <a:latin typeface="Times New Roman" panose="02020603050405020304" pitchFamily="18" charset="0"/>
-                <a:cs typeface="Times New Roman" panose="02020603050405020304" pitchFamily="18" charset="0"/>
-              </a:rPr>
-              <a:t>Les matages dominants dans les réseaux d’eaux sont: PVC19701990, FONTEGRISE19401970 FONTEDUCTIBLE19661980 et PVC19902020</a:t>
-            </a:r>
-          </a:p>
-          <a:p>
-            <a:pPr marL="285750" indent="-285750">
-              <a:buFont typeface="Wingdings" panose="05000000000000000000" pitchFamily="2" charset="2"/>
-              <a:buChar char="à"/>
-            </a:pPr>
-            <a:r>
-              <a:rPr lang="fr-FR" sz="1600" dirty="0" smtClean="0">
-                <a:latin typeface="Times New Roman" panose="02020603050405020304" pitchFamily="18" charset="0"/>
-                <a:cs typeface="Times New Roman" panose="02020603050405020304" pitchFamily="18" charset="0"/>
-              </a:rPr>
-              <a:t>Les collectivités qui contiennent plus de tuyaux (de données) sont les collectivités 22, 13, 12 et 23</a:t>
-            </a:r>
-          </a:p>
-        </p:txBody>
-      </p:sp>
-      <p:pic>
-        <p:nvPicPr>
-          <p:cNvPr id="4" name="Image 3" descr="Capture d’écran"/>
-          <p:cNvPicPr>
-            <a:picLocks noChangeAspect="1"/>
-          </p:cNvPicPr>
-          <p:nvPr/>
-        </p:nvPicPr>
-        <p:blipFill>
-          <a:blip r:embed="rId2">
-            <a:extLst>
-              <a:ext uri="{28A0092B-C50C-407E-A947-70E740481C1C}">
-                <a14:useLocalDpi xmlns:a14="http://schemas.microsoft.com/office/drawing/2010/main" val="0"/>
-              </a:ext>
-            </a:extLst>
-          </a:blip>
-          <a:stretch>
-            <a:fillRect/>
-          </a:stretch>
-        </p:blipFill>
-        <p:spPr>
-          <a:xfrm>
-            <a:off x="0" y="0"/>
-            <a:ext cx="12157290" cy="5373512"/>
-          </a:xfrm>
-          <a:prstGeom prst="rect">
-            <a:avLst/>
-          </a:prstGeom>
-        </p:spPr>
-      </p:pic>
-    </p:spTree>
-    <p:extLst>
-      <p:ext uri="{BB962C8B-B14F-4D97-AF65-F5344CB8AC3E}">
-        <p14:creationId xmlns:p14="http://schemas.microsoft.com/office/powerpoint/2010/main" val="3121601237"/>
-      </p:ext>
-    </p:extLst>
-  </p:cSld>
-  <p:clrMapOvr>
-    <a:masterClrMapping/>
-  </p:clrMapOvr>
-</p:sld>
-</file>
-
-<file path=ppt/slides/slide4.xml><?xml version="1.0" encoding="utf-8"?>
-<p:sld xmlns:a="http://schemas.openxmlformats.org/drawingml/2006/main" xmlns:r="http://schemas.openxmlformats.org/officeDocument/2006/relationships" xmlns:p="http://schemas.openxmlformats.org/presentationml/2006/main">
-  <p:cSld>
-    <p:spTree>
-      <p:nvGrpSpPr>
-        <p:cNvPr id="1" name=""/>
-        <p:cNvGrpSpPr/>
-        <p:nvPr/>
-      </p:nvGrpSpPr>
-      <p:grpSpPr>
-        <a:xfrm>
-          <a:off x="0" y="0"/>
-          <a:ext cx="0" cy="0"/>
-          <a:chOff x="0" y="0"/>
-          <a:chExt cx="0" cy="0"/>
-        </a:xfrm>
-      </p:grpSpPr>
-      <p:pic>
-        <p:nvPicPr>
-          <p:cNvPr id="4" name="Image 3" descr="Capture d’écran"/>
-          <p:cNvPicPr>
-            <a:picLocks noChangeAspect="1"/>
-          </p:cNvPicPr>
-          <p:nvPr/>
-        </p:nvPicPr>
-        <p:blipFill rotWithShape="1">
-          <a:blip r:embed="rId2">
-            <a:extLst>
-              <a:ext uri="{28A0092B-C50C-407E-A947-70E740481C1C}">
-                <a14:useLocalDpi xmlns:a14="http://schemas.microsoft.com/office/drawing/2010/main" val="0"/>
-              </a:ext>
-            </a:extLst>
-          </a:blip>
-          <a:srcRect t="1234"/>
-          <a:stretch/>
-        </p:blipFill>
-        <p:spPr>
-          <a:xfrm>
-            <a:off x="0" y="0"/>
-            <a:ext cx="12192000" cy="6242195"/>
-          </a:xfrm>
-          <a:prstGeom prst="rect">
-            <a:avLst/>
-          </a:prstGeom>
-        </p:spPr>
-      </p:pic>
-      <p:sp>
-        <p:nvSpPr>
-          <p:cNvPr id="6" name="Rectangle à coins arrondis 5"/>
-          <p:cNvSpPr/>
-          <p:nvPr/>
-        </p:nvSpPr>
-        <p:spPr>
-          <a:xfrm>
-            <a:off x="-28224" y="6180667"/>
-            <a:ext cx="5875867" cy="711201"/>
-          </a:xfrm>
-          <a:prstGeom prst="roundRect">
-            <a:avLst/>
-          </a:prstGeom>
-        </p:spPr>
-        <p:style>
-          <a:lnRef idx="2">
-            <a:schemeClr val="dk1"/>
-          </a:lnRef>
-          <a:fillRef idx="1">
-            <a:schemeClr val="lt1"/>
-          </a:fillRef>
-          <a:effectRef idx="0">
-            <a:schemeClr val="dk1"/>
-          </a:effectRef>
-          <a:fontRef idx="minor">
-            <a:schemeClr val="dk1"/>
-          </a:fontRef>
-        </p:style>
-        <p:txBody>
-          <a:bodyPr rtlCol="0" anchor="ctr"/>
-          <a:lstStyle/>
-          <a:p>
-            <a:r>
-              <a:rPr lang="fr-FR" sz="1600" dirty="0" smtClean="0">
-                <a:latin typeface="Times New Roman" panose="02020603050405020304" pitchFamily="18" charset="0"/>
-                <a:cs typeface="Times New Roman" panose="02020603050405020304" pitchFamily="18" charset="0"/>
-                <a:sym typeface="Wingdings" panose="05000000000000000000" pitchFamily="2" charset="2"/>
-              </a:rPr>
-              <a:t> </a:t>
-            </a:r>
-            <a:r>
-              <a:rPr lang="fr-FR" sz="1600" dirty="0" smtClean="0">
-                <a:latin typeface="Times New Roman" panose="02020603050405020304" pitchFamily="18" charset="0"/>
-                <a:cs typeface="Times New Roman" panose="02020603050405020304" pitchFamily="18" charset="0"/>
-              </a:rPr>
-              <a:t>Grande majorité de nb de casses de FONTEDUCTILE, FONTEGRISE et PVC  </a:t>
-            </a:r>
-            <a:br>
-              <a:rPr lang="fr-FR" sz="1600" dirty="0" smtClean="0">
-                <a:latin typeface="Times New Roman" panose="02020603050405020304" pitchFamily="18" charset="0"/>
-                <a:cs typeface="Times New Roman" panose="02020603050405020304" pitchFamily="18" charset="0"/>
-              </a:rPr>
-            </a:br>
-            <a:r>
-              <a:rPr lang="fr-FR" sz="1600" dirty="0" smtClean="0">
-                <a:latin typeface="Times New Roman" panose="02020603050405020304" pitchFamily="18" charset="0"/>
-                <a:cs typeface="Times New Roman" panose="02020603050405020304" pitchFamily="18" charset="0"/>
-                <a:sym typeface="Wingdings" panose="05000000000000000000" pitchFamily="2" charset="2"/>
-              </a:rPr>
-              <a:t> </a:t>
-            </a:r>
-            <a:r>
-              <a:rPr lang="fr-FR" sz="1600" dirty="0">
-                <a:latin typeface="Times New Roman" panose="02020603050405020304" pitchFamily="18" charset="0"/>
-                <a:cs typeface="Times New Roman" panose="02020603050405020304" pitchFamily="18" charset="0"/>
-                <a:sym typeface="Wingdings" panose="05000000000000000000" pitchFamily="2" charset="2"/>
-              </a:rPr>
-              <a:t>M</a:t>
-            </a:r>
-            <a:r>
-              <a:rPr lang="fr-FR" sz="1600" dirty="0" smtClean="0">
-                <a:latin typeface="Times New Roman" panose="02020603050405020304" pitchFamily="18" charset="0"/>
-                <a:cs typeface="Times New Roman" panose="02020603050405020304" pitchFamily="18" charset="0"/>
-              </a:rPr>
-              <a:t>inorité </a:t>
-            </a:r>
-            <a:r>
-              <a:rPr lang="fr-FR" sz="1600" dirty="0" smtClean="0">
-                <a:latin typeface="Times New Roman" panose="02020603050405020304" pitchFamily="18" charset="0"/>
-                <a:cs typeface="Times New Roman" panose="02020603050405020304" pitchFamily="18" charset="0"/>
-              </a:rPr>
-              <a:t>de nb de casses </a:t>
-            </a:r>
-            <a:r>
-              <a:rPr lang="fr-FR" sz="1600" dirty="0" smtClean="0">
-                <a:latin typeface="Times New Roman" panose="02020603050405020304" pitchFamily="18" charset="0"/>
-                <a:cs typeface="Times New Roman" panose="02020603050405020304" pitchFamily="18" charset="0"/>
-              </a:rPr>
-              <a:t>de Plomb et PEBD</a:t>
-            </a:r>
-            <a:endParaRPr lang="en-GB" sz="1600" dirty="0"/>
-          </a:p>
-        </p:txBody>
-      </p:sp>
-      <p:sp>
-        <p:nvSpPr>
-          <p:cNvPr id="9" name="Rectangle à coins arrondis 8"/>
-          <p:cNvSpPr/>
-          <p:nvPr/>
-        </p:nvSpPr>
-        <p:spPr>
-          <a:xfrm>
-            <a:off x="6180667" y="6180667"/>
-            <a:ext cx="6011333" cy="677333"/>
-          </a:xfrm>
-          <a:prstGeom prst="roundRect">
-            <a:avLst/>
-          </a:prstGeom>
-        </p:spPr>
-        <p:style>
-          <a:lnRef idx="2">
-            <a:schemeClr val="dk1"/>
-          </a:lnRef>
-          <a:fillRef idx="1">
-            <a:schemeClr val="lt1"/>
-          </a:fillRef>
-          <a:effectRef idx="0">
-            <a:schemeClr val="dk1"/>
-          </a:effectRef>
-          <a:fontRef idx="minor">
-            <a:schemeClr val="dk1"/>
-          </a:fontRef>
-        </p:style>
-        <p:txBody>
-          <a:bodyPr rtlCol="0" anchor="ctr"/>
-          <a:lstStyle/>
-          <a:p>
-            <a:r>
-              <a:rPr lang="fr-FR" sz="1600" dirty="0" smtClean="0">
-                <a:latin typeface="Times New Roman" panose="02020603050405020304" pitchFamily="18" charset="0"/>
-                <a:cs typeface="Times New Roman" panose="02020603050405020304" pitchFamily="18" charset="0"/>
-                <a:sym typeface="Wingdings" panose="05000000000000000000" pitchFamily="2" charset="2"/>
-              </a:rPr>
-              <a:t>Majorité de </a:t>
-            </a:r>
-            <a:r>
-              <a:rPr lang="fr-FR" sz="1600" dirty="0" smtClean="0">
-                <a:latin typeface="Times New Roman" panose="02020603050405020304" pitchFamily="18" charset="0"/>
-                <a:cs typeface="Times New Roman" panose="02020603050405020304" pitchFamily="18" charset="0"/>
-              </a:rPr>
-              <a:t>FONTEDUCTILE19661980, FONTEGRISE19301940 et PVC19701990</a:t>
-            </a:r>
-            <a:endParaRPr lang="en-GB" sz="1600" dirty="0"/>
-          </a:p>
-        </p:txBody>
-      </p:sp>
-    </p:spTree>
-    <p:extLst>
-      <p:ext uri="{BB962C8B-B14F-4D97-AF65-F5344CB8AC3E}">
-        <p14:creationId xmlns:p14="http://schemas.microsoft.com/office/powerpoint/2010/main" val="3702469745"/>
-      </p:ext>
-    </p:extLst>
-  </p:cSld>
-  <p:clrMapOvr>
-    <a:masterClrMapping/>
-  </p:clrMapOvr>
-</p:sld>
-</file>
-
-<file path=ppt/slides/slide5.xml><?xml version="1.0" encoding="utf-8"?>
+<file path=ppt/slides/slide14.xml><?xml version="1.0" encoding="utf-8"?>
 <p:sld xmlns:a="http://schemas.openxmlformats.org/drawingml/2006/main" xmlns:r="http://schemas.openxmlformats.org/officeDocument/2006/relationships" xmlns:p="http://schemas.openxmlformats.org/presentationml/2006/main">
   <p:cSld>
     <p:spTree>
@@ -7349,7 +6982,7 @@
         <p:spPr>
           <a:xfrm>
             <a:off x="0" y="0"/>
-            <a:ext cx="12192000" cy="5909733"/>
+            <a:ext cx="12192000" cy="5588287"/>
           </a:xfrm>
           <a:prstGeom prst="rect">
             <a:avLst/>
@@ -7358,13 +6991,118 @@
       </p:pic>
       <p:sp>
         <p:nvSpPr>
-          <p:cNvPr id="3" name="Rectangle à coins arrondis 2"/>
+          <p:cNvPr id="3" name="Titre 1"/>
+          <p:cNvSpPr txBox="1">
+            <a:spLocks/>
+          </p:cNvSpPr>
+          <p:nvPr/>
+        </p:nvSpPr>
+        <p:spPr>
+          <a:xfrm>
+            <a:off x="0" y="5567331"/>
+            <a:ext cx="10364451" cy="1290669"/>
+          </a:xfrm>
+          <a:prstGeom prst="rect">
+            <a:avLst/>
+          </a:prstGeom>
+        </p:spPr>
+        <p:txBody>
+          <a:bodyPr>
+            <a:normAutofit/>
+          </a:bodyPr>
+          <a:lstStyle>
+            <a:lvl1pPr algn="ctr" defTabSz="914400" rtl="0" eaLnBrk="1" latinLnBrk="0" hangingPunct="1">
+              <a:lnSpc>
+                <a:spcPct val="90000"/>
+              </a:lnSpc>
+              <a:spcBef>
+                <a:spcPct val="0"/>
+              </a:spcBef>
+              <a:buNone/>
+              <a:defRPr sz="3600" kern="1200" cap="all" baseline="0">
+                <a:solidFill>
+                  <a:schemeClr val="tx1"/>
+                </a:solidFill>
+                <a:effectLst/>
+                <a:latin typeface="+mj-lt"/>
+                <a:ea typeface="+mj-ea"/>
+                <a:cs typeface="+mj-cs"/>
+              </a:defRPr>
+            </a:lvl1pPr>
+          </a:lstStyle>
+          <a:p>
+            <a:pPr algn="l"/>
+            <a:endParaRPr lang="en-GB" sz="1400" dirty="0">
+              <a:latin typeface="Times New Roman" panose="02020603050405020304" pitchFamily="18" charset="0"/>
+              <a:cs typeface="Times New Roman" panose="02020603050405020304" pitchFamily="18" charset="0"/>
+            </a:endParaRPr>
+          </a:p>
+        </p:txBody>
+      </p:sp>
+      <p:sp>
+        <p:nvSpPr>
+          <p:cNvPr id="4" name="Rectangle à coins arrondis 3"/>
           <p:cNvSpPr/>
           <p:nvPr/>
         </p:nvSpPr>
         <p:spPr>
           <a:xfrm>
-            <a:off x="1354667" y="6047597"/>
+            <a:off x="2952044" y="6165929"/>
+            <a:ext cx="6287912" cy="427270"/>
+          </a:xfrm>
+          <a:prstGeom prst="roundRect">
+            <a:avLst/>
+          </a:prstGeom>
+        </p:spPr>
+        <p:style>
+          <a:lnRef idx="2">
+            <a:schemeClr val="dk1"/>
+          </a:lnRef>
+          <a:fillRef idx="1">
+            <a:schemeClr val="lt1"/>
+          </a:fillRef>
+          <a:effectRef idx="0">
+            <a:schemeClr val="dk1"/>
+          </a:effectRef>
+          <a:fontRef idx="minor">
+            <a:schemeClr val="dk1"/>
+          </a:fontRef>
+        </p:style>
+        <p:txBody>
+          <a:bodyPr rtlCol="0" anchor="ctr"/>
+          <a:lstStyle/>
+          <a:p>
+            <a:r>
+              <a:rPr lang="fr-FR" sz="1600" dirty="0" smtClean="0">
+                <a:latin typeface="Times New Roman" panose="02020603050405020304" pitchFamily="18" charset="0"/>
+                <a:cs typeface="Times New Roman" panose="02020603050405020304" pitchFamily="18" charset="0"/>
+                <a:sym typeface="Wingdings" panose="05000000000000000000" pitchFamily="2" charset="2"/>
+              </a:rPr>
+              <a:t></a:t>
+            </a:r>
+            <a:r>
+              <a:rPr lang="fr-FR" sz="1600" dirty="0" smtClean="0">
+                <a:latin typeface="Times New Roman" panose="02020603050405020304" pitchFamily="18" charset="0"/>
+                <a:cs typeface="Times New Roman" panose="02020603050405020304" pitchFamily="18" charset="0"/>
+              </a:rPr>
+              <a:t>ACIER, FONTEGRISE et PEHD sont très peu fiables à faible diamètre</a:t>
+            </a:r>
+            <a:endParaRPr lang="en-GB" sz="1600" dirty="0" smtClean="0">
+              <a:latin typeface="Times New Roman" panose="02020603050405020304" pitchFamily="18" charset="0"/>
+              <a:cs typeface="Times New Roman" panose="02020603050405020304" pitchFamily="18" charset="0"/>
+            </a:endParaRPr>
+          </a:p>
+        </p:txBody>
+      </p:sp>
+      <p:sp>
+        <p:nvSpPr>
+          <p:cNvPr id="5" name="Rectangle à coins arrondis 4"/>
+          <p:cNvSpPr/>
+          <p:nvPr/>
+        </p:nvSpPr>
+        <p:spPr>
+          <a:xfrm>
+            <a:off x="3081867" y="5659472"/>
             <a:ext cx="5875867" cy="375781"/>
           </a:xfrm>
           <a:prstGeom prst="roundRect">
@@ -7397,13 +7135,22 @@
             <a:r>
               <a:rPr lang="fr-FR" sz="1600" dirty="0" smtClean="0">
                 <a:solidFill>
+                  <a:schemeClr val="tx1"/>
+                </a:solidFill>
+                <a:latin typeface="Times New Roman" panose="02020603050405020304" pitchFamily="18" charset="0"/>
+                <a:cs typeface="Times New Roman" panose="02020603050405020304" pitchFamily="18" charset="0"/>
+              </a:rPr>
+              <a:t>En prenant en compte de </a:t>
+            </a:r>
+            <a:r>
+              <a:rPr lang="fr-FR" sz="1600" dirty="0" smtClean="0">
+                <a:solidFill>
                   <a:srgbClr val="FF0000"/>
                 </a:solidFill>
                 <a:latin typeface="Times New Roman" panose="02020603050405020304" pitchFamily="18" charset="0"/>
                 <a:cs typeface="Times New Roman" panose="02020603050405020304" pitchFamily="18" charset="0"/>
-                <a:sym typeface="Wingdings" panose="05000000000000000000" pitchFamily="2" charset="2"/>
               </a:rPr>
-              <a:t> PEBD, PLOMB, FONTEGRISE et ACIER</a:t>
+              <a:t>nombre total des tuyaux:</a:t>
             </a:r>
             <a:endParaRPr lang="en-GB" sz="1600" dirty="0">
               <a:solidFill>
@@ -7415,10 +7162,1199 @@
           </a:p>
         </p:txBody>
       </p:sp>
+      <p:sp>
+        <p:nvSpPr>
+          <p:cNvPr id="6" name="Rectangle à coins arrondis 5"/>
+          <p:cNvSpPr/>
+          <p:nvPr/>
+        </p:nvSpPr>
+        <p:spPr>
+          <a:xfrm>
+            <a:off x="2543982" y="1326321"/>
+            <a:ext cx="9516473" cy="608357"/>
+          </a:xfrm>
+          <a:prstGeom prst="roundRect">
+            <a:avLst/>
+          </a:prstGeom>
+        </p:spPr>
+        <p:style>
+          <a:lnRef idx="2">
+            <a:schemeClr val="dk1"/>
+          </a:lnRef>
+          <a:fillRef idx="1">
+            <a:schemeClr val="lt1"/>
+          </a:fillRef>
+          <a:effectRef idx="0">
+            <a:schemeClr val="dk1"/>
+          </a:effectRef>
+          <a:fontRef idx="minor">
+            <a:schemeClr val="dk1"/>
+          </a:fontRef>
+        </p:style>
+        <p:txBody>
+          <a:bodyPr rtlCol="0" anchor="ctr"/>
+          <a:lstStyle/>
+          <a:p>
+            <a:r>
+              <a:rPr lang="fr-FR" sz="1600" dirty="0" smtClean="0">
+                <a:latin typeface="Times New Roman" panose="02020603050405020304" pitchFamily="18" charset="0"/>
+                <a:cs typeface="Times New Roman" panose="02020603050405020304" pitchFamily="18" charset="0"/>
+                <a:sym typeface="Wingdings" panose="05000000000000000000" pitchFamily="2" charset="2"/>
+              </a:rPr>
+              <a:t>170 catégorie de diamètre des tuyaux installés pour chaque matériaux qui ne sont pas cassés (peut être manque d’information)</a:t>
+            </a:r>
+            <a:endParaRPr lang="en-GB" sz="1600" dirty="0">
+              <a:latin typeface="Times New Roman" panose="02020603050405020304" pitchFamily="18" charset="0"/>
+              <a:cs typeface="Times New Roman" panose="02020603050405020304" pitchFamily="18" charset="0"/>
+            </a:endParaRPr>
+          </a:p>
+        </p:txBody>
+      </p:sp>
     </p:spTree>
     <p:extLst>
       <p:ext uri="{BB962C8B-B14F-4D97-AF65-F5344CB8AC3E}">
-        <p14:creationId xmlns:p14="http://schemas.microsoft.com/office/powerpoint/2010/main" val="1249474607"/>
+        <p14:creationId xmlns:p14="http://schemas.microsoft.com/office/powerpoint/2010/main" val="1934597613"/>
+      </p:ext>
+    </p:extLst>
+  </p:cSld>
+  <p:clrMapOvr>
+    <a:masterClrMapping/>
+  </p:clrMapOvr>
+</p:sld>
+</file>
+
+<file path=ppt/slides/slide15.xml><?xml version="1.0" encoding="utf-8"?>
+<p:sld xmlns:a="http://schemas.openxmlformats.org/drawingml/2006/main" xmlns:r="http://schemas.openxmlformats.org/officeDocument/2006/relationships" xmlns:p="http://schemas.openxmlformats.org/presentationml/2006/main">
+  <p:cSld>
+    <p:spTree>
+      <p:nvGrpSpPr>
+        <p:cNvPr id="1" name=""/>
+        <p:cNvGrpSpPr/>
+        <p:nvPr/>
+      </p:nvGrpSpPr>
+      <p:grpSpPr>
+        <a:xfrm>
+          <a:off x="0" y="0"/>
+          <a:ext cx="0" cy="0"/>
+          <a:chOff x="0" y="0"/>
+          <a:chExt cx="0" cy="0"/>
+        </a:xfrm>
+      </p:grpSpPr>
+      <p:pic>
+        <p:nvPicPr>
+          <p:cNvPr id="3" name="Image 2"/>
+          <p:cNvPicPr>
+            <a:picLocks noChangeAspect="1"/>
+          </p:cNvPicPr>
+          <p:nvPr/>
+        </p:nvPicPr>
+        <p:blipFill>
+          <a:blip r:embed="rId2"/>
+          <a:stretch>
+            <a:fillRect/>
+          </a:stretch>
+        </p:blipFill>
+        <p:spPr>
+          <a:xfrm>
+            <a:off x="3614724" y="0"/>
+            <a:ext cx="8577276" cy="6858000"/>
+          </a:xfrm>
+          <a:prstGeom prst="rect">
+            <a:avLst/>
+          </a:prstGeom>
+        </p:spPr>
+      </p:pic>
+      <p:sp>
+        <p:nvSpPr>
+          <p:cNvPr id="5" name="Rectangle à coins arrondis 4"/>
+          <p:cNvSpPr/>
+          <p:nvPr/>
+        </p:nvSpPr>
+        <p:spPr>
+          <a:xfrm>
+            <a:off x="0" y="2257779"/>
+            <a:ext cx="3505200" cy="1998132"/>
+          </a:xfrm>
+          <a:prstGeom prst="roundRect">
+            <a:avLst/>
+          </a:prstGeom>
+        </p:spPr>
+        <p:style>
+          <a:lnRef idx="2">
+            <a:schemeClr val="dk1"/>
+          </a:lnRef>
+          <a:fillRef idx="1">
+            <a:schemeClr val="lt1"/>
+          </a:fillRef>
+          <a:effectRef idx="0">
+            <a:schemeClr val="dk1"/>
+          </a:effectRef>
+          <a:fontRef idx="minor">
+            <a:schemeClr val="dk1"/>
+          </a:fontRef>
+        </p:style>
+        <p:txBody>
+          <a:bodyPr rtlCol="0" anchor="ctr"/>
+          <a:lstStyle/>
+          <a:p>
+            <a:r>
+              <a:rPr lang="fr-FR" sz="1600" dirty="0" smtClean="0">
+                <a:latin typeface="Times New Roman" panose="02020603050405020304" pitchFamily="18" charset="0"/>
+                <a:cs typeface="Times New Roman" panose="02020603050405020304" pitchFamily="18" charset="0"/>
+              </a:rPr>
+              <a:t>Récemment observées: 14, 19, 4, 23, 21, 8</a:t>
+            </a:r>
+          </a:p>
+          <a:p>
+            <a:r>
+              <a:rPr lang="fr-FR" sz="1600" dirty="0" smtClean="0">
+                <a:latin typeface="Times New Roman" panose="02020603050405020304" pitchFamily="18" charset="0"/>
+                <a:cs typeface="Times New Roman" panose="02020603050405020304" pitchFamily="18" charset="0"/>
+              </a:rPr>
+              <a:t>Perte de vue (présence des paliers): 12, 15, 20, 2, 24, 25, 3, 9</a:t>
+            </a:r>
+          </a:p>
+          <a:p>
+            <a:r>
+              <a:rPr lang="fr-FR" sz="1600" dirty="0">
+                <a:latin typeface="Times New Roman" panose="02020603050405020304" pitchFamily="18" charset="0"/>
+                <a:cs typeface="Times New Roman" panose="02020603050405020304" pitchFamily="18" charset="0"/>
+              </a:rPr>
+              <a:t>Profils </a:t>
+            </a:r>
+            <a:r>
+              <a:rPr lang="fr-FR" sz="1600" dirty="0" smtClean="0">
+                <a:latin typeface="Times New Roman" panose="02020603050405020304" pitchFamily="18" charset="0"/>
+                <a:cs typeface="Times New Roman" panose="02020603050405020304" pitchFamily="18" charset="0"/>
+              </a:rPr>
+              <a:t>pertinents: </a:t>
+            </a:r>
+            <a:r>
+              <a:rPr lang="fr-FR" sz="1600" dirty="0">
+                <a:latin typeface="Times New Roman" panose="02020603050405020304" pitchFamily="18" charset="0"/>
+                <a:cs typeface="Times New Roman" panose="02020603050405020304" pitchFamily="18" charset="0"/>
+              </a:rPr>
+              <a:t>22, 6, 1, 18, 13, 7, 10, 11, 16, 17,  </a:t>
+            </a:r>
+          </a:p>
+          <a:p>
+            <a:endParaRPr lang="fr-FR" sz="1600" dirty="0" smtClean="0">
+              <a:latin typeface="Times New Roman" panose="02020603050405020304" pitchFamily="18" charset="0"/>
+              <a:cs typeface="Times New Roman" panose="02020603050405020304" pitchFamily="18" charset="0"/>
+            </a:endParaRPr>
+          </a:p>
+          <a:p>
+            <a:r>
+              <a:rPr lang="fr-FR" sz="1600" dirty="0" smtClean="0">
+                <a:latin typeface="Times New Roman" panose="02020603050405020304" pitchFamily="18" charset="0"/>
+                <a:cs typeface="Times New Roman" panose="02020603050405020304" pitchFamily="18" charset="0"/>
+              </a:rPr>
+              <a:t> </a:t>
+            </a:r>
+            <a:endParaRPr lang="fr-FR" sz="1600" dirty="0" smtClean="0">
+              <a:latin typeface="Times New Roman" panose="02020603050405020304" pitchFamily="18" charset="0"/>
+              <a:cs typeface="Times New Roman" panose="02020603050405020304" pitchFamily="18" charset="0"/>
+            </a:endParaRPr>
+          </a:p>
+        </p:txBody>
+      </p:sp>
+    </p:spTree>
+    <p:extLst>
+      <p:ext uri="{BB962C8B-B14F-4D97-AF65-F5344CB8AC3E}">
+        <p14:creationId xmlns:p14="http://schemas.microsoft.com/office/powerpoint/2010/main" val="3392648303"/>
+      </p:ext>
+    </p:extLst>
+  </p:cSld>
+  <p:clrMapOvr>
+    <a:masterClrMapping/>
+  </p:clrMapOvr>
+</p:sld>
+</file>
+
+<file path=ppt/slides/slide16.xml><?xml version="1.0" encoding="utf-8"?>
+<p:sld xmlns:a="http://schemas.openxmlformats.org/drawingml/2006/main" xmlns:r="http://schemas.openxmlformats.org/officeDocument/2006/relationships" xmlns:p="http://schemas.openxmlformats.org/presentationml/2006/main">
+  <p:cSld>
+    <p:spTree>
+      <p:nvGrpSpPr>
+        <p:cNvPr id="1" name=""/>
+        <p:cNvGrpSpPr/>
+        <p:nvPr/>
+      </p:nvGrpSpPr>
+      <p:grpSpPr>
+        <a:xfrm>
+          <a:off x="0" y="0"/>
+          <a:ext cx="0" cy="0"/>
+          <a:chOff x="0" y="0"/>
+          <a:chExt cx="0" cy="0"/>
+        </a:xfrm>
+      </p:grpSpPr>
+      <p:pic>
+        <p:nvPicPr>
+          <p:cNvPr id="2" name="Image 1"/>
+          <p:cNvPicPr>
+            <a:picLocks noChangeAspect="1"/>
+          </p:cNvPicPr>
+          <p:nvPr/>
+        </p:nvPicPr>
+        <p:blipFill>
+          <a:blip r:embed="rId2"/>
+          <a:stretch>
+            <a:fillRect/>
+          </a:stretch>
+        </p:blipFill>
+        <p:spPr>
+          <a:xfrm>
+            <a:off x="2996088" y="1020441"/>
+            <a:ext cx="5848755" cy="4053899"/>
+          </a:xfrm>
+          <a:prstGeom prst="rect">
+            <a:avLst/>
+          </a:prstGeom>
+        </p:spPr>
+      </p:pic>
+    </p:spTree>
+    <p:extLst>
+      <p:ext uri="{BB962C8B-B14F-4D97-AF65-F5344CB8AC3E}">
+        <p14:creationId xmlns:p14="http://schemas.microsoft.com/office/powerpoint/2010/main" val="2897079212"/>
+      </p:ext>
+    </p:extLst>
+  </p:cSld>
+  <p:clrMapOvr>
+    <a:masterClrMapping/>
+  </p:clrMapOvr>
+</p:sld>
+</file>
+
+<file path=ppt/slides/slide17.xml><?xml version="1.0" encoding="utf-8"?>
+<p:sld xmlns:a="http://schemas.openxmlformats.org/drawingml/2006/main" xmlns:r="http://schemas.openxmlformats.org/officeDocument/2006/relationships" xmlns:p="http://schemas.openxmlformats.org/presentationml/2006/main">
+  <p:cSld>
+    <p:spTree>
+      <p:nvGrpSpPr>
+        <p:cNvPr id="1" name=""/>
+        <p:cNvGrpSpPr/>
+        <p:nvPr/>
+      </p:nvGrpSpPr>
+      <p:grpSpPr>
+        <a:xfrm>
+          <a:off x="0" y="0"/>
+          <a:ext cx="0" cy="0"/>
+          <a:chOff x="0" y="0"/>
+          <a:chExt cx="0" cy="0"/>
+        </a:xfrm>
+      </p:grpSpPr>
+      <p:pic>
+        <p:nvPicPr>
+          <p:cNvPr id="4" name="Image 3"/>
+          <p:cNvPicPr>
+            <a:picLocks noChangeAspect="1"/>
+          </p:cNvPicPr>
+          <p:nvPr/>
+        </p:nvPicPr>
+        <p:blipFill>
+          <a:blip r:embed="rId2"/>
+          <a:stretch>
+            <a:fillRect/>
+          </a:stretch>
+        </p:blipFill>
+        <p:spPr>
+          <a:xfrm>
+            <a:off x="3609922" y="0"/>
+            <a:ext cx="8582078" cy="6858000"/>
+          </a:xfrm>
+          <a:prstGeom prst="rect">
+            <a:avLst/>
+          </a:prstGeom>
+        </p:spPr>
+      </p:pic>
+      <p:sp>
+        <p:nvSpPr>
+          <p:cNvPr id="5" name="Rectangle à coins arrondis 4"/>
+          <p:cNvSpPr/>
+          <p:nvPr/>
+        </p:nvSpPr>
+        <p:spPr>
+          <a:xfrm>
+            <a:off x="104722" y="1430868"/>
+            <a:ext cx="3505200" cy="1998132"/>
+          </a:xfrm>
+          <a:prstGeom prst="roundRect">
+            <a:avLst/>
+          </a:prstGeom>
+        </p:spPr>
+        <p:style>
+          <a:lnRef idx="2">
+            <a:schemeClr val="dk1"/>
+          </a:lnRef>
+          <a:fillRef idx="1">
+            <a:schemeClr val="lt1"/>
+          </a:fillRef>
+          <a:effectRef idx="0">
+            <a:schemeClr val="dk1"/>
+          </a:effectRef>
+          <a:fontRef idx="minor">
+            <a:schemeClr val="dk1"/>
+          </a:fontRef>
+        </p:style>
+        <p:txBody>
+          <a:bodyPr rtlCol="0" anchor="ctr"/>
+          <a:lstStyle/>
+          <a:p>
+            <a:r>
+              <a:rPr lang="fr-FR" sz="1600" dirty="0" smtClean="0">
+                <a:latin typeface="Times New Roman" panose="02020603050405020304" pitchFamily="18" charset="0"/>
+                <a:cs typeface="Times New Roman" panose="02020603050405020304" pitchFamily="18" charset="0"/>
+              </a:rPr>
+              <a:t>-Récemment observées: PEHD</a:t>
+            </a:r>
+          </a:p>
+          <a:p>
+            <a:r>
+              <a:rPr lang="fr-FR" sz="1600" dirty="0" smtClean="0">
+                <a:latin typeface="Times New Roman" panose="02020603050405020304" pitchFamily="18" charset="0"/>
+                <a:cs typeface="Times New Roman" panose="02020603050405020304" pitchFamily="18" charset="0"/>
+              </a:rPr>
+              <a:t>-Perte de vue (présence des paliers): BONNA, ACIER, FONDUCTILE et PVC</a:t>
+            </a:r>
+          </a:p>
+          <a:p>
+            <a:r>
+              <a:rPr lang="fr-FR" sz="1600" dirty="0" smtClean="0">
+                <a:latin typeface="Times New Roman" panose="02020603050405020304" pitchFamily="18" charset="0"/>
+                <a:cs typeface="Times New Roman" panose="02020603050405020304" pitchFamily="18" charset="0"/>
+              </a:rPr>
+              <a:t>-Profils pertinent: FONTEGRISE</a:t>
+            </a:r>
+            <a:endParaRPr lang="fr-FR" sz="1600" dirty="0">
+              <a:latin typeface="Times New Roman" panose="02020603050405020304" pitchFamily="18" charset="0"/>
+              <a:cs typeface="Times New Roman" panose="02020603050405020304" pitchFamily="18" charset="0"/>
+            </a:endParaRPr>
+          </a:p>
+          <a:p>
+            <a:endParaRPr lang="fr-FR" sz="1600" dirty="0" smtClean="0">
+              <a:latin typeface="Times New Roman" panose="02020603050405020304" pitchFamily="18" charset="0"/>
+              <a:cs typeface="Times New Roman" panose="02020603050405020304" pitchFamily="18" charset="0"/>
+            </a:endParaRPr>
+          </a:p>
+          <a:p>
+            <a:r>
+              <a:rPr lang="fr-FR" sz="1600" dirty="0" smtClean="0">
+                <a:latin typeface="Times New Roman" panose="02020603050405020304" pitchFamily="18" charset="0"/>
+                <a:cs typeface="Times New Roman" panose="02020603050405020304" pitchFamily="18" charset="0"/>
+              </a:rPr>
+              <a:t> </a:t>
+            </a:r>
+            <a:endParaRPr lang="fr-FR" sz="1600" dirty="0" smtClean="0">
+              <a:latin typeface="Times New Roman" panose="02020603050405020304" pitchFamily="18" charset="0"/>
+              <a:cs typeface="Times New Roman" panose="02020603050405020304" pitchFamily="18" charset="0"/>
+            </a:endParaRPr>
+          </a:p>
+        </p:txBody>
+      </p:sp>
+    </p:spTree>
+    <p:extLst>
+      <p:ext uri="{BB962C8B-B14F-4D97-AF65-F5344CB8AC3E}">
+        <p14:creationId xmlns:p14="http://schemas.microsoft.com/office/powerpoint/2010/main" val="2934624611"/>
+      </p:ext>
+    </p:extLst>
+  </p:cSld>
+  <p:clrMapOvr>
+    <a:masterClrMapping/>
+  </p:clrMapOvr>
+</p:sld>
+</file>
+
+<file path=ppt/slides/slide18.xml><?xml version="1.0" encoding="utf-8"?>
+<p:sld xmlns:a="http://schemas.openxmlformats.org/drawingml/2006/main" xmlns:r="http://schemas.openxmlformats.org/officeDocument/2006/relationships" xmlns:p="http://schemas.openxmlformats.org/presentationml/2006/main">
+  <p:cSld>
+    <p:spTree>
+      <p:nvGrpSpPr>
+        <p:cNvPr id="1" name=""/>
+        <p:cNvGrpSpPr/>
+        <p:nvPr/>
+      </p:nvGrpSpPr>
+      <p:grpSpPr>
+        <a:xfrm>
+          <a:off x="0" y="0"/>
+          <a:ext cx="0" cy="0"/>
+          <a:chOff x="0" y="0"/>
+          <a:chExt cx="0" cy="0"/>
+        </a:xfrm>
+      </p:grpSpPr>
+      <p:pic>
+        <p:nvPicPr>
+          <p:cNvPr id="2" name="Image 1"/>
+          <p:cNvPicPr>
+            <a:picLocks noChangeAspect="1"/>
+          </p:cNvPicPr>
+          <p:nvPr/>
+        </p:nvPicPr>
+        <p:blipFill>
+          <a:blip r:embed="rId2"/>
+          <a:stretch>
+            <a:fillRect/>
+          </a:stretch>
+        </p:blipFill>
+        <p:spPr>
+          <a:xfrm>
+            <a:off x="2360926" y="39512"/>
+            <a:ext cx="9831074" cy="6858000"/>
+          </a:xfrm>
+          <a:prstGeom prst="rect">
+            <a:avLst/>
+          </a:prstGeom>
+        </p:spPr>
+      </p:pic>
+      <p:sp>
+        <p:nvSpPr>
+          <p:cNvPr id="3" name="Rectangle à coins arrondis 2"/>
+          <p:cNvSpPr/>
+          <p:nvPr/>
+        </p:nvSpPr>
+        <p:spPr>
+          <a:xfrm>
+            <a:off x="0" y="2232379"/>
+            <a:ext cx="2360926" cy="1998132"/>
+          </a:xfrm>
+          <a:prstGeom prst="roundRect">
+            <a:avLst/>
+          </a:prstGeom>
+        </p:spPr>
+        <p:style>
+          <a:lnRef idx="2">
+            <a:schemeClr val="dk1"/>
+          </a:lnRef>
+          <a:fillRef idx="1">
+            <a:schemeClr val="lt1"/>
+          </a:fillRef>
+          <a:effectRef idx="0">
+            <a:schemeClr val="dk1"/>
+          </a:effectRef>
+          <a:fontRef idx="minor">
+            <a:schemeClr val="dk1"/>
+          </a:fontRef>
+        </p:style>
+        <p:txBody>
+          <a:bodyPr rtlCol="0" anchor="ctr"/>
+          <a:lstStyle/>
+          <a:p>
+            <a:r>
+              <a:rPr lang="fr-FR" sz="1600" dirty="0" smtClean="0">
+                <a:latin typeface="Times New Roman" panose="02020603050405020304" pitchFamily="18" charset="0"/>
+                <a:cs typeface="Times New Roman" panose="02020603050405020304" pitchFamily="18" charset="0"/>
+              </a:rPr>
+              <a:t>-Profils pertinents: FONTEGRISE</a:t>
+            </a:r>
+            <a:endParaRPr lang="fr-FR" sz="1600" dirty="0">
+              <a:latin typeface="Times New Roman" panose="02020603050405020304" pitchFamily="18" charset="0"/>
+              <a:cs typeface="Times New Roman" panose="02020603050405020304" pitchFamily="18" charset="0"/>
+            </a:endParaRPr>
+          </a:p>
+          <a:p>
+            <a:endParaRPr lang="fr-FR" sz="1600" dirty="0" smtClean="0">
+              <a:latin typeface="Times New Roman" panose="02020603050405020304" pitchFamily="18" charset="0"/>
+              <a:cs typeface="Times New Roman" panose="02020603050405020304" pitchFamily="18" charset="0"/>
+            </a:endParaRPr>
+          </a:p>
+          <a:p>
+            <a:r>
+              <a:rPr lang="fr-FR" sz="1600" dirty="0" smtClean="0">
+                <a:latin typeface="Times New Roman" panose="02020603050405020304" pitchFamily="18" charset="0"/>
+                <a:cs typeface="Times New Roman" panose="02020603050405020304" pitchFamily="18" charset="0"/>
+              </a:rPr>
+              <a:t> </a:t>
+            </a:r>
+            <a:endParaRPr lang="fr-FR" sz="1600" dirty="0" smtClean="0">
+              <a:latin typeface="Times New Roman" panose="02020603050405020304" pitchFamily="18" charset="0"/>
+              <a:cs typeface="Times New Roman" panose="02020603050405020304" pitchFamily="18" charset="0"/>
+            </a:endParaRPr>
+          </a:p>
+        </p:txBody>
+      </p:sp>
+    </p:spTree>
+    <p:extLst>
+      <p:ext uri="{BB962C8B-B14F-4D97-AF65-F5344CB8AC3E}">
+        <p14:creationId xmlns:p14="http://schemas.microsoft.com/office/powerpoint/2010/main" val="3633728596"/>
+      </p:ext>
+    </p:extLst>
+  </p:cSld>
+  <p:clrMapOvr>
+    <a:masterClrMapping/>
+  </p:clrMapOvr>
+</p:sld>
+</file>
+
+<file path=ppt/slides/slide19.xml><?xml version="1.0" encoding="utf-8"?>
+<p:sld xmlns:a="http://schemas.openxmlformats.org/drawingml/2006/main" xmlns:r="http://schemas.openxmlformats.org/officeDocument/2006/relationships" xmlns:p="http://schemas.openxmlformats.org/presentationml/2006/main">
+  <p:cSld>
+    <p:spTree>
+      <p:nvGrpSpPr>
+        <p:cNvPr id="1" name=""/>
+        <p:cNvGrpSpPr/>
+        <p:nvPr/>
+      </p:nvGrpSpPr>
+      <p:grpSpPr>
+        <a:xfrm>
+          <a:off x="0" y="0"/>
+          <a:ext cx="0" cy="0"/>
+          <a:chOff x="0" y="0"/>
+          <a:chExt cx="0" cy="0"/>
+        </a:xfrm>
+      </p:grpSpPr>
+      <p:pic>
+        <p:nvPicPr>
+          <p:cNvPr id="5" name="Image 4"/>
+          <p:cNvPicPr>
+            <a:picLocks noChangeAspect="1"/>
+          </p:cNvPicPr>
+          <p:nvPr/>
+        </p:nvPicPr>
+        <p:blipFill rotWithShape="1">
+          <a:blip r:embed="rId2"/>
+          <a:srcRect t="49136"/>
+          <a:stretch/>
+        </p:blipFill>
+        <p:spPr>
+          <a:xfrm>
+            <a:off x="6189571" y="1981201"/>
+            <a:ext cx="6002429" cy="4876800"/>
+          </a:xfrm>
+          <a:prstGeom prst="rect">
+            <a:avLst/>
+          </a:prstGeom>
+        </p:spPr>
+      </p:pic>
+      <p:grpSp>
+        <p:nvGrpSpPr>
+          <p:cNvPr id="8" name="Groupe 7"/>
+          <p:cNvGrpSpPr/>
+          <p:nvPr/>
+        </p:nvGrpSpPr>
+        <p:grpSpPr>
+          <a:xfrm>
+            <a:off x="0" y="0"/>
+            <a:ext cx="6175346" cy="4995334"/>
+            <a:chOff x="0" y="0"/>
+            <a:chExt cx="6175346" cy="4995334"/>
+          </a:xfrm>
+        </p:grpSpPr>
+        <p:pic>
+          <p:nvPicPr>
+            <p:cNvPr id="6" name="Image 5"/>
+            <p:cNvPicPr>
+              <a:picLocks noChangeAspect="1"/>
+            </p:cNvPicPr>
+            <p:nvPr/>
+          </p:nvPicPr>
+          <p:blipFill rotWithShape="1">
+            <a:blip r:embed="rId2"/>
+            <a:srcRect b="50617"/>
+            <a:stretch/>
+          </p:blipFill>
+          <p:spPr>
+            <a:xfrm>
+              <a:off x="0" y="0"/>
+              <a:ext cx="6175346" cy="4871156"/>
+            </a:xfrm>
+            <a:prstGeom prst="rect">
+              <a:avLst/>
+            </a:prstGeom>
+          </p:spPr>
+        </p:pic>
+        <p:pic>
+          <p:nvPicPr>
+            <p:cNvPr id="7" name="Image 6"/>
+            <p:cNvPicPr>
+              <a:picLocks noChangeAspect="1"/>
+            </p:cNvPicPr>
+            <p:nvPr/>
+          </p:nvPicPr>
+          <p:blipFill rotWithShape="1">
+            <a:blip r:embed="rId2"/>
+            <a:srcRect t="98469"/>
+            <a:stretch/>
+          </p:blipFill>
+          <p:spPr>
+            <a:xfrm>
+              <a:off x="0" y="4844350"/>
+              <a:ext cx="6175346" cy="150984"/>
+            </a:xfrm>
+            <a:prstGeom prst="rect">
+              <a:avLst/>
+            </a:prstGeom>
+          </p:spPr>
+        </p:pic>
+      </p:grpSp>
+    </p:spTree>
+    <p:extLst>
+      <p:ext uri="{BB962C8B-B14F-4D97-AF65-F5344CB8AC3E}">
+        <p14:creationId xmlns:p14="http://schemas.microsoft.com/office/powerpoint/2010/main" val="1670776028"/>
+      </p:ext>
+    </p:extLst>
+  </p:cSld>
+  <p:clrMapOvr>
+    <a:masterClrMapping/>
+  </p:clrMapOvr>
+</p:sld>
+</file>
+
+<file path=ppt/slides/slide2.xml><?xml version="1.0" encoding="utf-8"?>
+<p:sld xmlns:a="http://schemas.openxmlformats.org/drawingml/2006/main" xmlns:r="http://schemas.openxmlformats.org/officeDocument/2006/relationships" xmlns:p="http://schemas.openxmlformats.org/presentationml/2006/main">
+  <p:cSld>
+    <p:spTree>
+      <p:nvGrpSpPr>
+        <p:cNvPr id="1" name=""/>
+        <p:cNvGrpSpPr/>
+        <p:nvPr/>
+      </p:nvGrpSpPr>
+      <p:grpSpPr>
+        <a:xfrm>
+          <a:off x="0" y="0"/>
+          <a:ext cx="0" cy="0"/>
+          <a:chOff x="0" y="0"/>
+          <a:chExt cx="0" cy="0"/>
+        </a:xfrm>
+      </p:grpSpPr>
+      <p:sp>
+        <p:nvSpPr>
+          <p:cNvPr id="2" name="Rectangle à coins arrondis 1"/>
+          <p:cNvSpPr/>
+          <p:nvPr/>
+        </p:nvSpPr>
+        <p:spPr>
+          <a:xfrm>
+            <a:off x="2884311" y="621350"/>
+            <a:ext cx="5875867" cy="375781"/>
+          </a:xfrm>
+          <a:prstGeom prst="roundRect">
+            <a:avLst/>
+          </a:prstGeom>
+          <a:ln/>
+        </p:spPr>
+        <p:style>
+          <a:lnRef idx="1">
+            <a:schemeClr val="accent5"/>
+          </a:lnRef>
+          <a:fillRef idx="3">
+            <a:schemeClr val="accent5"/>
+          </a:fillRef>
+          <a:effectRef idx="2">
+            <a:schemeClr val="accent5"/>
+          </a:effectRef>
+          <a:fontRef idx="minor">
+            <a:schemeClr val="lt1"/>
+          </a:fontRef>
+        </p:style>
+        <p:txBody>
+          <a:bodyPr rtlCol="0" anchor="ctr"/>
+          <a:lstStyle/>
+          <a:p>
+            <a:pPr algn="ctr"/>
+            <a:r>
+              <a:rPr lang="fr-FR" sz="2000" dirty="0" smtClean="0">
+                <a:solidFill>
+                  <a:schemeClr val="tx1"/>
+                </a:solidFill>
+                <a:latin typeface="Times New Roman" panose="02020603050405020304" pitchFamily="18" charset="0"/>
+                <a:cs typeface="Times New Roman" panose="02020603050405020304" pitchFamily="18" charset="0"/>
+              </a:rPr>
+              <a:t>Reformulation du problème</a:t>
+            </a:r>
+            <a:endParaRPr lang="en-GB" sz="2000" dirty="0">
+              <a:solidFill>
+                <a:srgbClr val="FF0000"/>
+              </a:solidFill>
+              <a:latin typeface="Times New Roman" panose="02020603050405020304" pitchFamily="18" charset="0"/>
+              <a:cs typeface="Times New Roman" panose="02020603050405020304" pitchFamily="18" charset="0"/>
+            </a:endParaRPr>
+          </a:p>
+        </p:txBody>
+      </p:sp>
+      <p:sp>
+        <p:nvSpPr>
+          <p:cNvPr id="3" name="Rectangle à coins arrondis 2"/>
+          <p:cNvSpPr/>
+          <p:nvPr/>
+        </p:nvSpPr>
+        <p:spPr>
+          <a:xfrm>
+            <a:off x="497359" y="1409075"/>
+            <a:ext cx="11390489" cy="1723869"/>
+          </a:xfrm>
+          <a:prstGeom prst="roundRect">
+            <a:avLst/>
+          </a:prstGeom>
+        </p:spPr>
+        <p:style>
+          <a:lnRef idx="2">
+            <a:schemeClr val="dk1"/>
+          </a:lnRef>
+          <a:fillRef idx="1">
+            <a:schemeClr val="lt1"/>
+          </a:fillRef>
+          <a:effectRef idx="0">
+            <a:schemeClr val="dk1"/>
+          </a:effectRef>
+          <a:fontRef idx="minor">
+            <a:schemeClr val="dk1"/>
+          </a:fontRef>
+        </p:style>
+        <p:txBody>
+          <a:bodyPr rtlCol="0" anchor="ctr"/>
+          <a:lstStyle/>
+          <a:p>
+            <a:r>
+              <a:rPr lang="fr-FR" sz="1600" b="1" dirty="0">
+                <a:latin typeface="Times New Roman" panose="02020603050405020304" pitchFamily="18" charset="0"/>
+                <a:cs typeface="Times New Roman" panose="02020603050405020304" pitchFamily="18" charset="0"/>
+              </a:rPr>
+              <a:t>Secteur</a:t>
+            </a:r>
+            <a:r>
+              <a:rPr lang="fr-FR" sz="1600" dirty="0">
+                <a:latin typeface="Times New Roman" panose="02020603050405020304" pitchFamily="18" charset="0"/>
+                <a:cs typeface="Times New Roman" panose="02020603050405020304" pitchFamily="18" charset="0"/>
+              </a:rPr>
+              <a:t>: Réseau de distribution d'eau </a:t>
+            </a:r>
+            <a:r>
+              <a:rPr lang="fr-FR" sz="1600" dirty="0" smtClean="0">
+                <a:latin typeface="Times New Roman" panose="02020603050405020304" pitchFamily="18" charset="0"/>
+                <a:cs typeface="Times New Roman" panose="02020603050405020304" pitchFamily="18" charset="0"/>
+              </a:rPr>
+              <a:t>potable</a:t>
+            </a:r>
+          </a:p>
+          <a:p>
+            <a:r>
+              <a:rPr lang="fr-FR" sz="1600" b="1" dirty="0" smtClean="0">
+                <a:latin typeface="Times New Roman" panose="02020603050405020304" pitchFamily="18" charset="0"/>
+                <a:cs typeface="Times New Roman" panose="02020603050405020304" pitchFamily="18" charset="0"/>
+              </a:rPr>
+              <a:t>Objectif</a:t>
+            </a:r>
+            <a:r>
+              <a:rPr lang="fr-FR" sz="1600" dirty="0" smtClean="0">
+                <a:latin typeface="Times New Roman" panose="02020603050405020304" pitchFamily="18" charset="0"/>
+                <a:cs typeface="Times New Roman" panose="02020603050405020304" pitchFamily="18" charset="0"/>
+              </a:rPr>
+              <a:t> : Créer </a:t>
+            </a:r>
+            <a:r>
+              <a:rPr lang="fr-FR" sz="1600" dirty="0">
+                <a:latin typeface="Times New Roman" panose="02020603050405020304" pitchFamily="18" charset="0"/>
+                <a:cs typeface="Times New Roman" panose="02020603050405020304" pitchFamily="18" charset="0"/>
+              </a:rPr>
+              <a:t>un modèle classant les tuyaux d'une base de données selon leur risque de </a:t>
+            </a:r>
+            <a:r>
+              <a:rPr lang="fr-FR" sz="1600" dirty="0" smtClean="0">
+                <a:latin typeface="Times New Roman" panose="02020603050405020304" pitchFamily="18" charset="0"/>
+                <a:cs typeface="Times New Roman" panose="02020603050405020304" pitchFamily="18" charset="0"/>
+              </a:rPr>
+              <a:t>casse</a:t>
+            </a:r>
+          </a:p>
+          <a:p>
+            <a:r>
+              <a:rPr lang="fr-FR" sz="1600" b="1" dirty="0" smtClean="0">
+                <a:latin typeface="Times New Roman" panose="02020603050405020304" pitchFamily="18" charset="0"/>
+                <a:cs typeface="Times New Roman" panose="02020603050405020304" pitchFamily="18" charset="0"/>
+              </a:rPr>
+              <a:t>Application </a:t>
+            </a:r>
+            <a:r>
+              <a:rPr lang="fr-FR" sz="1600" b="1" dirty="0">
+                <a:latin typeface="Times New Roman" panose="02020603050405020304" pitchFamily="18" charset="0"/>
+                <a:cs typeface="Times New Roman" panose="02020603050405020304" pitchFamily="18" charset="0"/>
+              </a:rPr>
+              <a:t>industrielle</a:t>
+            </a:r>
+            <a:r>
+              <a:rPr lang="fr-FR" sz="1600" dirty="0">
+                <a:latin typeface="Times New Roman" panose="02020603050405020304" pitchFamily="18" charset="0"/>
+                <a:cs typeface="Times New Roman" panose="02020603050405020304" pitchFamily="18" charset="0"/>
+              </a:rPr>
+              <a:t>: Planifier les réparations avant la casse</a:t>
+            </a:r>
+          </a:p>
+          <a:p>
+            <a:r>
+              <a:rPr lang="fr-FR" sz="1600" b="1" dirty="0" smtClean="0">
+                <a:latin typeface="Times New Roman" panose="02020603050405020304" pitchFamily="18" charset="0"/>
+                <a:cs typeface="Times New Roman" panose="02020603050405020304" pitchFamily="18" charset="0"/>
+              </a:rPr>
+              <a:t>Données </a:t>
+            </a:r>
+            <a:r>
+              <a:rPr lang="fr-FR" sz="1600" b="1" dirty="0">
+                <a:latin typeface="Times New Roman" panose="02020603050405020304" pitchFamily="18" charset="0"/>
+                <a:cs typeface="Times New Roman" panose="02020603050405020304" pitchFamily="18" charset="0"/>
+              </a:rPr>
+              <a:t>exogènes</a:t>
+            </a:r>
+            <a:r>
+              <a:rPr lang="fr-FR" sz="1600" dirty="0">
+                <a:latin typeface="Times New Roman" panose="02020603050405020304" pitchFamily="18" charset="0"/>
+                <a:cs typeface="Times New Roman" panose="02020603050405020304" pitchFamily="18" charset="0"/>
+              </a:rPr>
+              <a:t>: Date de pose, Diamètre, Matériau, Matage, Collectivité,</a:t>
+            </a:r>
+          </a:p>
+          <a:p>
+            <a:r>
+              <a:rPr lang="fr-FR" sz="1600" b="1" dirty="0" smtClean="0">
+                <a:latin typeface="Times New Roman" panose="02020603050405020304" pitchFamily="18" charset="0"/>
+                <a:cs typeface="Times New Roman" panose="02020603050405020304" pitchFamily="18" charset="0"/>
+              </a:rPr>
+              <a:t>Cible</a:t>
+            </a:r>
+            <a:r>
+              <a:rPr lang="fr-FR" sz="1600" dirty="0">
+                <a:latin typeface="Times New Roman" panose="02020603050405020304" pitchFamily="18" charset="0"/>
+                <a:cs typeface="Times New Roman" panose="02020603050405020304" pitchFamily="18" charset="0"/>
+              </a:rPr>
+              <a:t>: Classer les dates de casse par ordre croissant -&gt; création d'un indicateur de qualité de classement</a:t>
+            </a:r>
+          </a:p>
+        </p:txBody>
+      </p:sp>
+    </p:spTree>
+    <p:extLst>
+      <p:ext uri="{BB962C8B-B14F-4D97-AF65-F5344CB8AC3E}">
+        <p14:creationId xmlns:p14="http://schemas.microsoft.com/office/powerpoint/2010/main" val="3167580966"/>
+      </p:ext>
+    </p:extLst>
+  </p:cSld>
+  <p:clrMapOvr>
+    <a:masterClrMapping/>
+  </p:clrMapOvr>
+</p:sld>
+</file>
+
+<file path=ppt/slides/slide3.xml><?xml version="1.0" encoding="utf-8"?>
+<p:sld xmlns:a="http://schemas.openxmlformats.org/drawingml/2006/main" xmlns:r="http://schemas.openxmlformats.org/officeDocument/2006/relationships" xmlns:p="http://schemas.openxmlformats.org/presentationml/2006/main">
+  <p:cSld>
+    <p:spTree>
+      <p:nvGrpSpPr>
+        <p:cNvPr id="1" name=""/>
+        <p:cNvGrpSpPr/>
+        <p:nvPr/>
+      </p:nvGrpSpPr>
+      <p:grpSpPr>
+        <a:xfrm>
+          <a:off x="0" y="0"/>
+          <a:ext cx="0" cy="0"/>
+          <a:chOff x="0" y="0"/>
+          <a:chExt cx="0" cy="0"/>
+        </a:xfrm>
+      </p:grpSpPr>
+      <p:sp>
+        <p:nvSpPr>
+          <p:cNvPr id="2" name="Rectangle à coins arrondis 1"/>
+          <p:cNvSpPr/>
+          <p:nvPr/>
+        </p:nvSpPr>
+        <p:spPr>
+          <a:xfrm>
+            <a:off x="452387" y="1469036"/>
+            <a:ext cx="11390489" cy="4048083"/>
+          </a:xfrm>
+          <a:prstGeom prst="roundRect">
+            <a:avLst/>
+          </a:prstGeom>
+        </p:spPr>
+        <p:style>
+          <a:lnRef idx="2">
+            <a:schemeClr val="dk1"/>
+          </a:lnRef>
+          <a:fillRef idx="1">
+            <a:schemeClr val="lt1"/>
+          </a:fillRef>
+          <a:effectRef idx="0">
+            <a:schemeClr val="dk1"/>
+          </a:effectRef>
+          <a:fontRef idx="minor">
+            <a:schemeClr val="dk1"/>
+          </a:fontRef>
+        </p:style>
+        <p:txBody>
+          <a:bodyPr rtlCol="0" anchor="ctr"/>
+          <a:lstStyle/>
+          <a:p>
+            <a:r>
+              <a:rPr lang="fr-FR" sz="1600" dirty="0" smtClean="0">
+                <a:latin typeface="Times New Roman" panose="02020603050405020304" pitchFamily="18" charset="0"/>
+                <a:cs typeface="Times New Roman" panose="02020603050405020304" pitchFamily="18" charset="0"/>
+              </a:rPr>
+              <a:t>1/ (4) Etude globale des données fournies pour avoir une idée sur les principaux composants d’un réseau d’eau.</a:t>
+            </a:r>
+          </a:p>
+          <a:p>
+            <a:r>
+              <a:rPr lang="fr-FR" sz="1600" dirty="0" smtClean="0">
+                <a:latin typeface="Times New Roman" panose="02020603050405020304" pitchFamily="18" charset="0"/>
+                <a:cs typeface="Times New Roman" panose="02020603050405020304" pitchFamily="18" charset="0"/>
+              </a:rPr>
+              <a:t>2/ (4-6) Etude qualitative qui permet de détecter les matériaux qui ont subit plus de casses, avec une étude normalisée qui permet de détecter les matages et les matériaux les plus risqués.</a:t>
+            </a:r>
+          </a:p>
+          <a:p>
+            <a:r>
+              <a:rPr lang="fr-FR" sz="1600" dirty="0" smtClean="0">
+                <a:latin typeface="Times New Roman" panose="02020603050405020304" pitchFamily="18" charset="0"/>
+                <a:cs typeface="Times New Roman" panose="02020603050405020304" pitchFamily="18" charset="0"/>
+              </a:rPr>
+              <a:t>3/ (7) Etude qualitative qui permet de détecter les collectivités les plus touchées et les matages les plus risqués dans ces collectivités.</a:t>
+            </a:r>
+          </a:p>
+          <a:p>
+            <a:r>
+              <a:rPr lang="fr-FR" sz="1600" dirty="0" smtClean="0">
+                <a:latin typeface="Times New Roman" panose="02020603050405020304" pitchFamily="18" charset="0"/>
+                <a:cs typeface="Times New Roman" panose="02020603050405020304" pitchFamily="18" charset="0"/>
+              </a:rPr>
+              <a:t>4/ (8) Etude quantitative qui permet de détecter les matages les plus risqués  en fonction de l’année de pose.</a:t>
+            </a:r>
+          </a:p>
+          <a:p>
+            <a:r>
+              <a:rPr lang="fr-FR" sz="1600" dirty="0" smtClean="0">
+                <a:latin typeface="Times New Roman" panose="02020603050405020304" pitchFamily="18" charset="0"/>
+                <a:cs typeface="Times New Roman" panose="02020603050405020304" pitchFamily="18" charset="0"/>
+              </a:rPr>
+              <a:t>5/ (9) Etude quantitative normalisée qui permet de détecter les années de pose …????</a:t>
+            </a:r>
+          </a:p>
+          <a:p>
+            <a:endParaRPr lang="fr-FR" sz="1600" dirty="0" smtClean="0">
+              <a:latin typeface="Times New Roman" panose="02020603050405020304" pitchFamily="18" charset="0"/>
+              <a:cs typeface="Times New Roman" panose="02020603050405020304" pitchFamily="18" charset="0"/>
+            </a:endParaRPr>
+          </a:p>
+          <a:p>
+            <a:r>
+              <a:rPr lang="fr-FR" sz="1600" dirty="0" smtClean="0">
+                <a:latin typeface="Times New Roman" panose="02020603050405020304" pitchFamily="18" charset="0"/>
+                <a:cs typeface="Times New Roman" panose="02020603050405020304" pitchFamily="18" charset="0"/>
+              </a:rPr>
+              <a:t>6/(10) Etude quantitative qui permet de détecter les diamètres qui ont subit plus de casses</a:t>
+            </a:r>
+          </a:p>
+          <a:p>
+            <a:r>
+              <a:rPr lang="fr-FR" sz="1600" dirty="0" smtClean="0">
+                <a:latin typeface="Times New Roman" panose="02020603050405020304" pitchFamily="18" charset="0"/>
+                <a:cs typeface="Times New Roman" panose="02020603050405020304" pitchFamily="18" charset="0"/>
+              </a:rPr>
+              <a:t>7/ (11) Etude quantitative normalisée qui permet d’identifier les diamètre les moins fiables</a:t>
+            </a:r>
+          </a:p>
+          <a:p>
+            <a:r>
+              <a:rPr lang="fr-FR" sz="1600" dirty="0" smtClean="0">
+                <a:latin typeface="Times New Roman" panose="02020603050405020304" pitchFamily="18" charset="0"/>
+                <a:cs typeface="Times New Roman" panose="02020603050405020304" pitchFamily="18" charset="0"/>
+              </a:rPr>
+              <a:t>8/ (12) Etude quantitative normalisée qui permet d’identifier les diamètre les moins fiables pour chaque matériau</a:t>
+            </a:r>
+          </a:p>
+        </p:txBody>
+      </p:sp>
+    </p:spTree>
+    <p:extLst>
+      <p:ext uri="{BB962C8B-B14F-4D97-AF65-F5344CB8AC3E}">
+        <p14:creationId xmlns:p14="http://schemas.microsoft.com/office/powerpoint/2010/main" val="622630890"/>
+      </p:ext>
+    </p:extLst>
+  </p:cSld>
+  <p:clrMapOvr>
+    <a:masterClrMapping/>
+  </p:clrMapOvr>
+</p:sld>
+</file>
+
+<file path=ppt/slides/slide4.xml><?xml version="1.0" encoding="utf-8"?>
+<p:sld xmlns:a="http://schemas.openxmlformats.org/drawingml/2006/main" xmlns:r="http://schemas.openxmlformats.org/officeDocument/2006/relationships" xmlns:p="http://schemas.openxmlformats.org/presentationml/2006/main">
+  <p:cSld>
+    <p:spTree>
+      <p:nvGrpSpPr>
+        <p:cNvPr id="1" name=""/>
+        <p:cNvGrpSpPr/>
+        <p:nvPr/>
+      </p:nvGrpSpPr>
+      <p:grpSpPr>
+        <a:xfrm>
+          <a:off x="0" y="0"/>
+          <a:ext cx="0" cy="0"/>
+          <a:chOff x="0" y="0"/>
+          <a:chExt cx="0" cy="0"/>
+        </a:xfrm>
+      </p:grpSpPr>
+      <p:sp>
+        <p:nvSpPr>
+          <p:cNvPr id="2" name="Title 1">
+            <a:extLst>
+              <a:ext uri="{FF2B5EF4-FFF2-40B4-BE49-F238E27FC236}">
+                <a16:creationId xmlns:a16="http://schemas.microsoft.com/office/drawing/2014/main" xmlns="" id="{7A3BFAE8-F26C-4885-95D6-A1B3771C2BDD}"/>
+              </a:ext>
+            </a:extLst>
+          </p:cNvPr>
+          <p:cNvSpPr>
+            <a:spLocks noGrp="1"/>
+          </p:cNvSpPr>
+          <p:nvPr>
+            <p:ph type="title"/>
+          </p:nvPr>
+        </p:nvSpPr>
+        <p:spPr/>
+        <p:txBody>
+          <a:bodyPr/>
+          <a:lstStyle/>
+          <a:p>
+            <a:r>
+              <a:rPr lang="fr-FR" dirty="0" smtClean="0"/>
+              <a:t>Etude Globale des données</a:t>
+            </a:r>
+            <a:endParaRPr lang="fr-FR" dirty="0"/>
+          </a:p>
+        </p:txBody>
+      </p:sp>
+    </p:spTree>
+    <p:extLst>
+      <p:ext uri="{BB962C8B-B14F-4D97-AF65-F5344CB8AC3E}">
+        <p14:creationId xmlns:p14="http://schemas.microsoft.com/office/powerpoint/2010/main" val="3461276736"/>
+      </p:ext>
+    </p:extLst>
+  </p:cSld>
+  <p:clrMapOvr>
+    <a:masterClrMapping/>
+  </p:clrMapOvr>
+</p:sld>
+</file>
+
+<file path=ppt/slides/slide5.xml><?xml version="1.0" encoding="utf-8"?>
+<p:sld xmlns:a="http://schemas.openxmlformats.org/drawingml/2006/main" xmlns:r="http://schemas.openxmlformats.org/officeDocument/2006/relationships" xmlns:p="http://schemas.openxmlformats.org/presentationml/2006/main">
+  <p:cSld>
+    <p:spTree>
+      <p:nvGrpSpPr>
+        <p:cNvPr id="1" name=""/>
+        <p:cNvGrpSpPr/>
+        <p:nvPr/>
+      </p:nvGrpSpPr>
+      <p:grpSpPr>
+        <a:xfrm>
+          <a:off x="0" y="0"/>
+          <a:ext cx="0" cy="0"/>
+          <a:chOff x="0" y="0"/>
+          <a:chExt cx="0" cy="0"/>
+        </a:xfrm>
+      </p:grpSpPr>
+      <p:sp>
+        <p:nvSpPr>
+          <p:cNvPr id="3" name="Rectangle à coins arrondis 2"/>
+          <p:cNvSpPr/>
+          <p:nvPr/>
+        </p:nvSpPr>
+        <p:spPr>
+          <a:xfrm>
+            <a:off x="400755" y="5520268"/>
+            <a:ext cx="11390489" cy="1196622"/>
+          </a:xfrm>
+          <a:prstGeom prst="roundRect">
+            <a:avLst/>
+          </a:prstGeom>
+        </p:spPr>
+        <p:style>
+          <a:lnRef idx="2">
+            <a:schemeClr val="dk1"/>
+          </a:lnRef>
+          <a:fillRef idx="1">
+            <a:schemeClr val="lt1"/>
+          </a:fillRef>
+          <a:effectRef idx="0">
+            <a:schemeClr val="dk1"/>
+          </a:effectRef>
+          <a:fontRef idx="minor">
+            <a:schemeClr val="dk1"/>
+          </a:fontRef>
+        </p:style>
+        <p:txBody>
+          <a:bodyPr rtlCol="0" anchor="ctr"/>
+          <a:lstStyle/>
+          <a:p>
+            <a:pPr marL="285750" indent="-285750">
+              <a:buFont typeface="Wingdings" panose="05000000000000000000" pitchFamily="2" charset="2"/>
+              <a:buChar char="à"/>
+            </a:pPr>
+            <a:r>
+              <a:rPr lang="fr-FR" sz="1600" dirty="0" smtClean="0">
+                <a:latin typeface="Times New Roman" panose="02020603050405020304" pitchFamily="18" charset="0"/>
+                <a:cs typeface="Times New Roman" panose="02020603050405020304" pitchFamily="18" charset="0"/>
+              </a:rPr>
+              <a:t>Les matériaux dominants dans les réseaux d’eau sont: le FONTEDUCTIBLE, FONTEGRISE, PVC et PEHD</a:t>
+            </a:r>
+          </a:p>
+          <a:p>
+            <a:pPr marL="285750" indent="-285750">
+              <a:buFont typeface="Wingdings" panose="05000000000000000000" pitchFamily="2" charset="2"/>
+              <a:buChar char="à"/>
+            </a:pPr>
+            <a:r>
+              <a:rPr lang="fr-FR" sz="1600" dirty="0" smtClean="0">
+                <a:latin typeface="Times New Roman" panose="02020603050405020304" pitchFamily="18" charset="0"/>
+                <a:cs typeface="Times New Roman" panose="02020603050405020304" pitchFamily="18" charset="0"/>
+              </a:rPr>
+              <a:t>Les matages dominants dans les réseaux d’eaux sont: PVC19701990, FONTEGRISE19401970 FONTEDUCTIBLE19661980 et PVC19902020</a:t>
+            </a:r>
+          </a:p>
+          <a:p>
+            <a:pPr marL="285750" indent="-285750">
+              <a:buFont typeface="Wingdings" panose="05000000000000000000" pitchFamily="2" charset="2"/>
+              <a:buChar char="à"/>
+            </a:pPr>
+            <a:r>
+              <a:rPr lang="fr-FR" sz="1600" dirty="0" smtClean="0">
+                <a:latin typeface="Times New Roman" panose="02020603050405020304" pitchFamily="18" charset="0"/>
+                <a:cs typeface="Times New Roman" panose="02020603050405020304" pitchFamily="18" charset="0"/>
+              </a:rPr>
+              <a:t>Les collectivités qui contiennent plus de tuyaux (de données) sont les collectivités 22, 13, 12 et 23</a:t>
+            </a:r>
+          </a:p>
+        </p:txBody>
+      </p:sp>
+      <p:pic>
+        <p:nvPicPr>
+          <p:cNvPr id="4" name="Image 3" descr="Capture d’écran"/>
+          <p:cNvPicPr>
+            <a:picLocks noChangeAspect="1"/>
+          </p:cNvPicPr>
+          <p:nvPr/>
+        </p:nvPicPr>
+        <p:blipFill rotWithShape="1">
+          <a:blip r:embed="rId2">
+            <a:extLst>
+              <a:ext uri="{28A0092B-C50C-407E-A947-70E740481C1C}">
+                <a14:useLocalDpi xmlns:a14="http://schemas.microsoft.com/office/drawing/2010/main" val="0"/>
+              </a:ext>
+            </a:extLst>
+          </a:blip>
+          <a:srcRect t="9315"/>
+          <a:stretch/>
+        </p:blipFill>
+        <p:spPr>
+          <a:xfrm>
+            <a:off x="0" y="500514"/>
+            <a:ext cx="12157290" cy="4872998"/>
+          </a:xfrm>
+          <a:prstGeom prst="rect">
+            <a:avLst/>
+          </a:prstGeom>
+        </p:spPr>
+      </p:pic>
+    </p:spTree>
+    <p:extLst>
+      <p:ext uri="{BB962C8B-B14F-4D97-AF65-F5344CB8AC3E}">
+        <p14:creationId xmlns:p14="http://schemas.microsoft.com/office/powerpoint/2010/main" val="3121601237"/>
       </p:ext>
     </p:extLst>
   </p:cSld>
@@ -7429,6 +8365,198 @@
 </file>
 
 <file path=ppt/slides/slide6.xml><?xml version="1.0" encoding="utf-8"?>
+<p:sld xmlns:a="http://schemas.openxmlformats.org/drawingml/2006/main" xmlns:r="http://schemas.openxmlformats.org/officeDocument/2006/relationships" xmlns:p="http://schemas.openxmlformats.org/presentationml/2006/main">
+  <p:cSld>
+    <p:spTree>
+      <p:nvGrpSpPr>
+        <p:cNvPr id="1" name=""/>
+        <p:cNvGrpSpPr/>
+        <p:nvPr/>
+      </p:nvGrpSpPr>
+      <p:grpSpPr>
+        <a:xfrm>
+          <a:off x="0" y="0"/>
+          <a:ext cx="0" cy="0"/>
+          <a:chOff x="0" y="0"/>
+          <a:chExt cx="0" cy="0"/>
+        </a:xfrm>
+      </p:grpSpPr>
+      <p:pic>
+        <p:nvPicPr>
+          <p:cNvPr id="4" name="Image 3" descr="Capture d’écran"/>
+          <p:cNvPicPr>
+            <a:picLocks noChangeAspect="1"/>
+          </p:cNvPicPr>
+          <p:nvPr/>
+        </p:nvPicPr>
+        <p:blipFill rotWithShape="1">
+          <a:blip r:embed="rId2">
+            <a:extLst>
+              <a:ext uri="{28A0092B-C50C-407E-A947-70E740481C1C}">
+                <a14:useLocalDpi xmlns:a14="http://schemas.microsoft.com/office/drawing/2010/main" val="0"/>
+              </a:ext>
+            </a:extLst>
+          </a:blip>
+          <a:srcRect t="1234"/>
+          <a:stretch/>
+        </p:blipFill>
+        <p:spPr>
+          <a:xfrm>
+            <a:off x="0" y="0"/>
+            <a:ext cx="12192000" cy="6242195"/>
+          </a:xfrm>
+          <a:prstGeom prst="rect">
+            <a:avLst/>
+          </a:prstGeom>
+        </p:spPr>
+      </p:pic>
+      <p:sp>
+        <p:nvSpPr>
+          <p:cNvPr id="6" name="Rectangle à coins arrondis 5"/>
+          <p:cNvSpPr/>
+          <p:nvPr/>
+        </p:nvSpPr>
+        <p:spPr>
+          <a:xfrm>
+            <a:off x="-28224" y="6180667"/>
+            <a:ext cx="5875867" cy="711201"/>
+          </a:xfrm>
+          <a:prstGeom prst="roundRect">
+            <a:avLst/>
+          </a:prstGeom>
+        </p:spPr>
+        <p:style>
+          <a:lnRef idx="2">
+            <a:schemeClr val="dk1"/>
+          </a:lnRef>
+          <a:fillRef idx="1">
+            <a:schemeClr val="lt1"/>
+          </a:fillRef>
+          <a:effectRef idx="0">
+            <a:schemeClr val="dk1"/>
+          </a:effectRef>
+          <a:fontRef idx="minor">
+            <a:schemeClr val="dk1"/>
+          </a:fontRef>
+        </p:style>
+        <p:txBody>
+          <a:bodyPr rtlCol="0" anchor="ctr"/>
+          <a:lstStyle/>
+          <a:p>
+            <a:r>
+              <a:rPr lang="fr-FR" sz="1600" dirty="0" smtClean="0">
+                <a:latin typeface="Times New Roman" panose="02020603050405020304" pitchFamily="18" charset="0"/>
+                <a:cs typeface="Times New Roman" panose="02020603050405020304" pitchFamily="18" charset="0"/>
+                <a:sym typeface="Wingdings" panose="05000000000000000000" pitchFamily="2" charset="2"/>
+              </a:rPr>
+              <a:t> </a:t>
+            </a:r>
+            <a:r>
+              <a:rPr lang="fr-FR" sz="1600" dirty="0" smtClean="0">
+                <a:latin typeface="Times New Roman" panose="02020603050405020304" pitchFamily="18" charset="0"/>
+                <a:cs typeface="Times New Roman" panose="02020603050405020304" pitchFamily="18" charset="0"/>
+              </a:rPr>
+              <a:t>Grande majorité de nb de casses de FONTEDUCTILE, FONTEGRISE et PVC  </a:t>
+            </a:r>
+            <a:br>
+              <a:rPr lang="fr-FR" sz="1600" dirty="0" smtClean="0">
+                <a:latin typeface="Times New Roman" panose="02020603050405020304" pitchFamily="18" charset="0"/>
+                <a:cs typeface="Times New Roman" panose="02020603050405020304" pitchFamily="18" charset="0"/>
+              </a:rPr>
+            </a:br>
+            <a:r>
+              <a:rPr lang="fr-FR" sz="1600" dirty="0" smtClean="0">
+                <a:latin typeface="Times New Roman" panose="02020603050405020304" pitchFamily="18" charset="0"/>
+                <a:cs typeface="Times New Roman" panose="02020603050405020304" pitchFamily="18" charset="0"/>
+                <a:sym typeface="Wingdings" panose="05000000000000000000" pitchFamily="2" charset="2"/>
+              </a:rPr>
+              <a:t> </a:t>
+            </a:r>
+            <a:r>
+              <a:rPr lang="fr-FR" sz="1600" dirty="0">
+                <a:latin typeface="Times New Roman" panose="02020603050405020304" pitchFamily="18" charset="0"/>
+                <a:cs typeface="Times New Roman" panose="02020603050405020304" pitchFamily="18" charset="0"/>
+                <a:sym typeface="Wingdings" panose="05000000000000000000" pitchFamily="2" charset="2"/>
+              </a:rPr>
+              <a:t>M</a:t>
+            </a:r>
+            <a:r>
+              <a:rPr lang="fr-FR" sz="1600" dirty="0" smtClean="0">
+                <a:latin typeface="Times New Roman" panose="02020603050405020304" pitchFamily="18" charset="0"/>
+                <a:cs typeface="Times New Roman" panose="02020603050405020304" pitchFamily="18" charset="0"/>
+              </a:rPr>
+              <a:t>inorité de nb de casses de Plomb et PEBD</a:t>
+            </a:r>
+            <a:endParaRPr lang="en-GB" sz="1600" dirty="0"/>
+          </a:p>
+        </p:txBody>
+      </p:sp>
+      <p:sp>
+        <p:nvSpPr>
+          <p:cNvPr id="9" name="Rectangle à coins arrondis 8"/>
+          <p:cNvSpPr/>
+          <p:nvPr/>
+        </p:nvSpPr>
+        <p:spPr>
+          <a:xfrm>
+            <a:off x="6180667" y="6180667"/>
+            <a:ext cx="6011333" cy="677333"/>
+          </a:xfrm>
+          <a:prstGeom prst="roundRect">
+            <a:avLst/>
+          </a:prstGeom>
+        </p:spPr>
+        <p:style>
+          <a:lnRef idx="2">
+            <a:schemeClr val="dk1"/>
+          </a:lnRef>
+          <a:fillRef idx="1">
+            <a:schemeClr val="lt1"/>
+          </a:fillRef>
+          <a:effectRef idx="0">
+            <a:schemeClr val="dk1"/>
+          </a:effectRef>
+          <a:fontRef idx="minor">
+            <a:schemeClr val="dk1"/>
+          </a:fontRef>
+        </p:style>
+        <p:txBody>
+          <a:bodyPr rtlCol="0" anchor="ctr"/>
+          <a:lstStyle/>
+          <a:p>
+            <a:r>
+              <a:rPr lang="fr-FR" sz="1600" dirty="0" smtClean="0">
+                <a:latin typeface="Times New Roman" panose="02020603050405020304" pitchFamily="18" charset="0"/>
+                <a:cs typeface="Times New Roman" panose="02020603050405020304" pitchFamily="18" charset="0"/>
+                <a:sym typeface="Wingdings" panose="05000000000000000000" pitchFamily="2" charset="2"/>
+              </a:rPr>
+              <a:t>Majorité de </a:t>
+            </a:r>
+            <a:r>
+              <a:rPr lang="fr-FR" sz="1600" dirty="0" smtClean="0">
+                <a:latin typeface="Times New Roman" panose="02020603050405020304" pitchFamily="18" charset="0"/>
+                <a:cs typeface="Times New Roman" panose="02020603050405020304" pitchFamily="18" charset="0"/>
+              </a:rPr>
+              <a:t>FONTEDUCTILE19661980, FONTEGRISE19301940 et PVC19701990</a:t>
+            </a:r>
+            <a:endParaRPr lang="en-GB" sz="1600" dirty="0"/>
+          </a:p>
+        </p:txBody>
+      </p:sp>
+    </p:spTree>
+    <p:extLst>
+      <p:ext uri="{BB962C8B-B14F-4D97-AF65-F5344CB8AC3E}">
+        <p14:creationId xmlns:p14="http://schemas.microsoft.com/office/powerpoint/2010/main" val="3702469745"/>
+      </p:ext>
+    </p:extLst>
+  </p:cSld>
+  <p:clrMapOvr>
+    <a:masterClrMapping/>
+  </p:clrMapOvr>
+</p:sld>
+</file>
+
+<file path=ppt/slides/slide7.xml><?xml version="1.0" encoding="utf-8"?>
 <p:sld xmlns:a="http://schemas.openxmlformats.org/drawingml/2006/main" xmlns:r="http://schemas.openxmlformats.org/officeDocument/2006/relationships" xmlns:p="http://schemas.openxmlformats.org/presentationml/2006/main">
   <p:cSld>
     <p:spTree>
@@ -7468,7 +8596,7 @@
         <p:spPr>
           <a:xfrm>
             <a:off x="0" y="0"/>
-            <a:ext cx="12192000" cy="5454930"/>
+            <a:ext cx="12192000" cy="5909733"/>
           </a:xfrm>
           <a:prstGeom prst="rect">
             <a:avLst/>
@@ -7477,143 +8605,13 @@
       </p:pic>
       <p:sp>
         <p:nvSpPr>
-          <p:cNvPr id="4" name="Rectangle à coins arrondis 3"/>
+          <p:cNvPr id="3" name="Rectangle à coins arrondis 2"/>
           <p:cNvSpPr/>
           <p:nvPr/>
         </p:nvSpPr>
         <p:spPr>
           <a:xfrm>
-            <a:off x="124172" y="5830711"/>
-            <a:ext cx="5875867" cy="1078089"/>
-          </a:xfrm>
-          <a:prstGeom prst="roundRect">
-            <a:avLst/>
-          </a:prstGeom>
-        </p:spPr>
-        <p:style>
-          <a:lnRef idx="2">
-            <a:schemeClr val="dk1"/>
-          </a:lnRef>
-          <a:fillRef idx="1">
-            <a:schemeClr val="lt1"/>
-          </a:fillRef>
-          <a:effectRef idx="0">
-            <a:schemeClr val="dk1"/>
-          </a:effectRef>
-          <a:fontRef idx="minor">
-            <a:schemeClr val="dk1"/>
-          </a:fontRef>
-        </p:style>
-        <p:txBody>
-          <a:bodyPr rtlCol="0" anchor="ctr"/>
-          <a:lstStyle/>
-          <a:p>
-            <a:r>
-              <a:rPr lang="fr-FR" sz="1600" dirty="0" smtClean="0">
-                <a:latin typeface="Times New Roman" panose="02020603050405020304" pitchFamily="18" charset="0"/>
-                <a:cs typeface="Times New Roman" panose="02020603050405020304" pitchFamily="18" charset="0"/>
-              </a:rPr>
-              <a:t>Peu fiable:</a:t>
-            </a:r>
-          </a:p>
-          <a:p>
-            <a:r>
-              <a:rPr lang="fr-FR" sz="1600" dirty="0" smtClean="0">
-                <a:latin typeface="Times New Roman" panose="02020603050405020304" pitchFamily="18" charset="0"/>
-                <a:cs typeface="Times New Roman" panose="02020603050405020304" pitchFamily="18" charset="0"/>
-              </a:rPr>
-              <a:t>- PLOMB, PEBD et ACIER quelque soit le type de matage </a:t>
-            </a:r>
-          </a:p>
-          <a:p>
-            <a:r>
-              <a:rPr lang="fr-FR" sz="1600" dirty="0" smtClean="0">
-                <a:latin typeface="Times New Roman" panose="02020603050405020304" pitchFamily="18" charset="0"/>
-                <a:cs typeface="Times New Roman" panose="02020603050405020304" pitchFamily="18" charset="0"/>
-              </a:rPr>
-              <a:t>- PVC19481970, FONTEGRISE18001900 et FONTEGRISE19401970</a:t>
-            </a:r>
-          </a:p>
-        </p:txBody>
-      </p:sp>
-      <p:sp>
-        <p:nvSpPr>
-          <p:cNvPr id="5" name="Rectangle à coins arrondis 4"/>
-          <p:cNvSpPr/>
-          <p:nvPr/>
-        </p:nvSpPr>
-        <p:spPr>
-          <a:xfrm>
-            <a:off x="6191956" y="5830711"/>
-            <a:ext cx="5875867" cy="1078089"/>
-          </a:xfrm>
-          <a:prstGeom prst="roundRect">
-            <a:avLst/>
-          </a:prstGeom>
-        </p:spPr>
-        <p:style>
-          <a:lnRef idx="2">
-            <a:schemeClr val="dk1"/>
-          </a:lnRef>
-          <a:fillRef idx="1">
-            <a:schemeClr val="lt1"/>
-          </a:fillRef>
-          <a:effectRef idx="0">
-            <a:schemeClr val="dk1"/>
-          </a:effectRef>
-          <a:fontRef idx="minor">
-            <a:schemeClr val="dk1"/>
-          </a:fontRef>
-        </p:style>
-        <p:txBody>
-          <a:bodyPr rtlCol="0" anchor="ctr"/>
-          <a:lstStyle/>
-          <a:p>
-            <a:r>
-              <a:rPr lang="fr-FR" sz="1600" dirty="0" smtClean="0">
-                <a:latin typeface="Times New Roman" panose="02020603050405020304" pitchFamily="18" charset="0"/>
-                <a:cs typeface="Times New Roman" panose="02020603050405020304" pitchFamily="18" charset="0"/>
-              </a:rPr>
-              <a:t>Assez fiable: (à enlever)</a:t>
-            </a:r>
-          </a:p>
-          <a:p>
-            <a:endParaRPr lang="fr-FR" sz="1600" dirty="0" smtClean="0">
-              <a:latin typeface="Times New Roman" panose="02020603050405020304" pitchFamily="18" charset="0"/>
-              <a:cs typeface="Times New Roman" panose="02020603050405020304" pitchFamily="18" charset="0"/>
-            </a:endParaRPr>
-          </a:p>
-          <a:p>
-            <a:r>
-              <a:rPr lang="fr-FR" sz="1600" dirty="0" smtClean="0">
-                <a:latin typeface="Times New Roman" panose="02020603050405020304" pitchFamily="18" charset="0"/>
-                <a:cs typeface="Times New Roman" panose="02020603050405020304" pitchFamily="18" charset="0"/>
-              </a:rPr>
-              <a:t>- </a:t>
-            </a:r>
-            <a:r>
-              <a:rPr lang="fr-FR" sz="1600" dirty="0" smtClean="0">
-                <a:latin typeface="Times New Roman" panose="02020603050405020304" pitchFamily="18" charset="0"/>
-                <a:cs typeface="Times New Roman" panose="02020603050405020304" pitchFamily="18" charset="0"/>
-              </a:rPr>
-              <a:t>FONTEDUCTILE, PEHD, BONNA.</a:t>
-            </a:r>
-            <a:endParaRPr lang="en-GB" sz="1600" dirty="0">
-              <a:latin typeface="Times New Roman" panose="02020603050405020304" pitchFamily="18" charset="0"/>
-              <a:cs typeface="Times New Roman" panose="02020603050405020304" pitchFamily="18" charset="0"/>
-            </a:endParaRPr>
-          </a:p>
-        </p:txBody>
-      </p:sp>
-      <p:sp>
-        <p:nvSpPr>
-          <p:cNvPr id="6" name="Rectangle à coins arrondis 5"/>
-          <p:cNvSpPr/>
-          <p:nvPr/>
-        </p:nvSpPr>
-        <p:spPr>
-          <a:xfrm>
-            <a:off x="2929467" y="5454930"/>
+            <a:off x="1354667" y="6047597"/>
             <a:ext cx="5875867" cy="375781"/>
           </a:xfrm>
           <a:prstGeom prst="roundRect">
@@ -7646,22 +8644,13 @@
             <a:r>
               <a:rPr lang="fr-FR" sz="1600" dirty="0" smtClean="0">
                 <a:solidFill>
-                  <a:schemeClr val="tx1"/>
-                </a:solidFill>
-                <a:latin typeface="Times New Roman" panose="02020603050405020304" pitchFamily="18" charset="0"/>
-                <a:cs typeface="Times New Roman" panose="02020603050405020304" pitchFamily="18" charset="0"/>
-              </a:rPr>
-              <a:t>En prenant en compte de </a:t>
-            </a:r>
-            <a:r>
-              <a:rPr lang="fr-FR" sz="1600" dirty="0" smtClean="0">
-                <a:solidFill>
                   <a:srgbClr val="FF0000"/>
                 </a:solidFill>
                 <a:latin typeface="Times New Roman" panose="02020603050405020304" pitchFamily="18" charset="0"/>
                 <a:cs typeface="Times New Roman" panose="02020603050405020304" pitchFamily="18" charset="0"/>
+                <a:sym typeface="Wingdings" panose="05000000000000000000" pitchFamily="2" charset="2"/>
               </a:rPr>
-              <a:t>nombre total des tuyaux:</a:t>
+              <a:t> PEBD, PLOMB, FONTEGRISE et ACIER</a:t>
             </a:r>
             <a:endParaRPr lang="en-GB" sz="1600" dirty="0">
               <a:solidFill>
@@ -7676,140 +8665,7 @@
     </p:spTree>
     <p:extLst>
       <p:ext uri="{BB962C8B-B14F-4D97-AF65-F5344CB8AC3E}">
-        <p14:creationId xmlns:p14="http://schemas.microsoft.com/office/powerpoint/2010/main" val="4250813282"/>
-      </p:ext>
-    </p:extLst>
-  </p:cSld>
-  <p:clrMapOvr>
-    <a:masterClrMapping/>
-  </p:clrMapOvr>
-</p:sld>
-</file>
-
-<file path=ppt/slides/slide7.xml><?xml version="1.0" encoding="utf-8"?>
-<p:sld xmlns:a="http://schemas.openxmlformats.org/drawingml/2006/main" xmlns:r="http://schemas.openxmlformats.org/officeDocument/2006/relationships" xmlns:p="http://schemas.openxmlformats.org/presentationml/2006/main">
-  <p:cSld>
-    <p:spTree>
-      <p:nvGrpSpPr>
-        <p:cNvPr id="1" name=""/>
-        <p:cNvGrpSpPr/>
-        <p:nvPr/>
-      </p:nvGrpSpPr>
-      <p:grpSpPr>
-        <a:xfrm>
-          <a:off x="0" y="0"/>
-          <a:ext cx="0" cy="0"/>
-          <a:chOff x="0" y="0"/>
-          <a:chExt cx="0" cy="0"/>
-        </a:xfrm>
-      </p:grpSpPr>
-      <p:pic>
-        <p:nvPicPr>
-          <p:cNvPr id="5" name="Image 4" descr="Capture d’écran"/>
-          <p:cNvPicPr>
-            <a:picLocks noChangeAspect="1"/>
-          </p:cNvPicPr>
-          <p:nvPr/>
-        </p:nvPicPr>
-        <p:blipFill>
-          <a:blip r:embed="rId2">
-            <a:extLst>
-              <a:ext uri="{28A0092B-C50C-407E-A947-70E740481C1C}">
-                <a14:useLocalDpi xmlns:a14="http://schemas.microsoft.com/office/drawing/2010/main" val="0"/>
-              </a:ext>
-            </a:extLst>
-          </a:blip>
-          <a:stretch>
-            <a:fillRect/>
-          </a:stretch>
-        </p:blipFill>
-        <p:spPr>
-          <a:xfrm>
-            <a:off x="0" y="0"/>
-            <a:ext cx="12192000" cy="5753396"/>
-          </a:xfrm>
-          <a:prstGeom prst="rect">
-            <a:avLst/>
-          </a:prstGeom>
-        </p:spPr>
-      </p:pic>
-      <p:sp>
-        <p:nvSpPr>
-          <p:cNvPr id="7" name="Rectangle à coins arrondis 6"/>
-          <p:cNvSpPr/>
-          <p:nvPr/>
-        </p:nvSpPr>
-        <p:spPr>
-          <a:xfrm>
-            <a:off x="400755" y="5862348"/>
-            <a:ext cx="11390489" cy="854541"/>
-          </a:xfrm>
-          <a:prstGeom prst="roundRect">
-            <a:avLst/>
-          </a:prstGeom>
-        </p:spPr>
-        <p:style>
-          <a:lnRef idx="2">
-            <a:schemeClr val="dk1"/>
-          </a:lnRef>
-          <a:fillRef idx="1">
-            <a:schemeClr val="lt1"/>
-          </a:fillRef>
-          <a:effectRef idx="0">
-            <a:schemeClr val="dk1"/>
-          </a:effectRef>
-          <a:fontRef idx="minor">
-            <a:schemeClr val="dk1"/>
-          </a:fontRef>
-        </p:style>
-        <p:txBody>
-          <a:bodyPr rtlCol="0" anchor="ctr"/>
-          <a:lstStyle/>
-          <a:p>
-            <a:pPr marL="285750" indent="-285750">
-              <a:buFont typeface="Wingdings" panose="05000000000000000000" pitchFamily="2" charset="2"/>
-              <a:buChar char="à"/>
-            </a:pPr>
-            <a:r>
-              <a:rPr lang="fr-FR" sz="1600" dirty="0" smtClean="0">
-                <a:latin typeface="Times New Roman" panose="02020603050405020304" pitchFamily="18" charset="0"/>
-                <a:cs typeface="Times New Roman" panose="02020603050405020304" pitchFamily="18" charset="0"/>
-              </a:rPr>
-              <a:t>Collectivité 22 et 13 présentent le plus de casses</a:t>
-            </a:r>
-          </a:p>
-          <a:p>
-            <a:pPr marL="285750" indent="-285750">
-              <a:buFont typeface="Wingdings" panose="05000000000000000000" pitchFamily="2" charset="2"/>
-              <a:buChar char="à"/>
-            </a:pPr>
-            <a:r>
-              <a:rPr lang="fr-FR" sz="1600" dirty="0" smtClean="0">
-                <a:latin typeface="Times New Roman" panose="02020603050405020304" pitchFamily="18" charset="0"/>
-                <a:cs typeface="Times New Roman" panose="02020603050405020304" pitchFamily="18" charset="0"/>
-              </a:rPr>
-              <a:t>Dans les collectivités 22 et 13, il y a une grande majorité de FONTEDUCTILE19661980, FONTEGRISE19401970 </a:t>
-            </a:r>
-          </a:p>
-          <a:p>
-            <a:pPr marL="285750" indent="-285750">
-              <a:buFont typeface="Wingdings" panose="05000000000000000000" pitchFamily="2" charset="2"/>
-              <a:buChar char="à"/>
-            </a:pPr>
-            <a:r>
-              <a:rPr lang="fr-FR" sz="1600" dirty="0" smtClean="0">
-                <a:latin typeface="Times New Roman" panose="02020603050405020304" pitchFamily="18" charset="0"/>
-                <a:cs typeface="Times New Roman" panose="02020603050405020304" pitchFamily="18" charset="0"/>
-              </a:rPr>
-              <a:t>Majorité de casses du PVC19701990</a:t>
-            </a:r>
-          </a:p>
-        </p:txBody>
-      </p:sp>
-    </p:spTree>
-    <p:extLst>
-      <p:ext uri="{BB962C8B-B14F-4D97-AF65-F5344CB8AC3E}">
-        <p14:creationId xmlns:p14="http://schemas.microsoft.com/office/powerpoint/2010/main" val="4217171424"/>
+        <p14:creationId xmlns:p14="http://schemas.microsoft.com/office/powerpoint/2010/main" val="1249474607"/>
       </p:ext>
     </p:extLst>
   </p:cSld>
@@ -7859,7 +8715,7 @@
         <p:spPr>
           <a:xfrm>
             <a:off x="0" y="0"/>
-            <a:ext cx="12192000" cy="5473981"/>
+            <a:ext cx="12192000" cy="5454930"/>
           </a:xfrm>
           <a:prstGeom prst="rect">
             <a:avLst/>
@@ -7874,8 +8730,8 @@
         </p:nvSpPr>
         <p:spPr>
           <a:xfrm>
-            <a:off x="400756" y="5743814"/>
-            <a:ext cx="11390489" cy="854541"/>
+            <a:off x="124172" y="5830711"/>
+            <a:ext cx="5875867" cy="1078089"/>
           </a:xfrm>
           <a:prstGeom prst="roundRect">
             <a:avLst/>
@@ -7903,33 +8759,84 @@
               <a:rPr lang="fr-FR" sz="1600" dirty="0" smtClean="0">
                 <a:latin typeface="Times New Roman" panose="02020603050405020304" pitchFamily="18" charset="0"/>
                 <a:cs typeface="Times New Roman" panose="02020603050405020304" pitchFamily="18" charset="0"/>
-                <a:sym typeface="Wingdings" panose="05000000000000000000" pitchFamily="2" charset="2"/>
               </a:rPr>
-              <a:t> </a:t>
-            </a:r>
+              <a:t>Peu fiable:</a:t>
+            </a:r>
+          </a:p>
+          <a:p>
             <a:r>
               <a:rPr lang="fr-FR" sz="1600" dirty="0" smtClean="0">
                 <a:latin typeface="Times New Roman" panose="02020603050405020304" pitchFamily="18" charset="0"/>
                 <a:cs typeface="Times New Roman" panose="02020603050405020304" pitchFamily="18" charset="0"/>
               </a:rPr>
-              <a:t>Grande majorité de casses de FONTEDUCTILE et PVC déposés entre 1967-1983</a:t>
-            </a:r>
-          </a:p>
-          <a:p>
-            <a:r>
-              <a:rPr lang="fr-FR" sz="1600" dirty="0" smtClean="0">
-                <a:latin typeface="Times New Roman" panose="02020603050405020304" pitchFamily="18" charset="0"/>
-                <a:cs typeface="Times New Roman" panose="02020603050405020304" pitchFamily="18" charset="0"/>
-                <a:sym typeface="Wingdings" panose="05000000000000000000" pitchFamily="2" charset="2"/>
-              </a:rPr>
-              <a:t> </a:t>
-            </a:r>
+              <a:t>- PLOMB, PEBD et ACIER quelque soit le type de matage </a:t>
+            </a:r>
+          </a:p>
+          <a:p>
             <a:r>
               <a:rPr lang="fr-FR" sz="1600" dirty="0" smtClean="0">
                 <a:latin typeface="Times New Roman" panose="02020603050405020304" pitchFamily="18" charset="0"/>
                 <a:cs typeface="Times New Roman" panose="02020603050405020304" pitchFamily="18" charset="0"/>
               </a:rPr>
-              <a:t>Grande majorité de FONTEGRISE déposés entre 1951-1967</a:t>
+              <a:t>- PVC19481970, FONTEGRISE18001900 et FONTEGRISE19401970</a:t>
+            </a:r>
+          </a:p>
+        </p:txBody>
+      </p:sp>
+      <p:sp>
+        <p:nvSpPr>
+          <p:cNvPr id="5" name="Rectangle à coins arrondis 4"/>
+          <p:cNvSpPr/>
+          <p:nvPr/>
+        </p:nvSpPr>
+        <p:spPr>
+          <a:xfrm>
+            <a:off x="6191956" y="5830711"/>
+            <a:ext cx="5875867" cy="1078089"/>
+          </a:xfrm>
+          <a:prstGeom prst="roundRect">
+            <a:avLst/>
+          </a:prstGeom>
+        </p:spPr>
+        <p:style>
+          <a:lnRef idx="2">
+            <a:schemeClr val="dk1"/>
+          </a:lnRef>
+          <a:fillRef idx="1">
+            <a:schemeClr val="lt1"/>
+          </a:fillRef>
+          <a:effectRef idx="0">
+            <a:schemeClr val="dk1"/>
+          </a:effectRef>
+          <a:fontRef idx="minor">
+            <a:schemeClr val="dk1"/>
+          </a:fontRef>
+        </p:style>
+        <p:txBody>
+          <a:bodyPr rtlCol="0" anchor="ctr"/>
+          <a:lstStyle/>
+          <a:p>
+            <a:r>
+              <a:rPr lang="fr-FR" sz="1600" dirty="0" smtClean="0">
+                <a:latin typeface="Times New Roman" panose="02020603050405020304" pitchFamily="18" charset="0"/>
+                <a:cs typeface="Times New Roman" panose="02020603050405020304" pitchFamily="18" charset="0"/>
+              </a:rPr>
+              <a:t>Assez fiable: (à enlever)</a:t>
+            </a:r>
+          </a:p>
+          <a:p>
+            <a:endParaRPr lang="fr-FR" sz="1600" dirty="0" smtClean="0">
+              <a:latin typeface="Times New Roman" panose="02020603050405020304" pitchFamily="18" charset="0"/>
+              <a:cs typeface="Times New Roman" panose="02020603050405020304" pitchFamily="18" charset="0"/>
+            </a:endParaRPr>
+          </a:p>
+          <a:p>
+            <a:r>
+              <a:rPr lang="fr-FR" sz="1600" dirty="0" smtClean="0">
+                <a:latin typeface="Times New Roman" panose="02020603050405020304" pitchFamily="18" charset="0"/>
+                <a:cs typeface="Times New Roman" panose="02020603050405020304" pitchFamily="18" charset="0"/>
+              </a:rPr>
+              <a:t>- FONTEDUCTILE, PEHD, BONNA.</a:t>
             </a:r>
             <a:endParaRPr lang="en-GB" sz="1600" dirty="0">
               <a:latin typeface="Times New Roman" panose="02020603050405020304" pitchFamily="18" charset="0"/>
@@ -7938,10 +8845,78 @@
           </a:p>
         </p:txBody>
       </p:sp>
+      <p:sp>
+        <p:nvSpPr>
+          <p:cNvPr id="6" name="Rectangle à coins arrondis 5"/>
+          <p:cNvSpPr/>
+          <p:nvPr/>
+        </p:nvSpPr>
+        <p:spPr>
+          <a:xfrm>
+            <a:off x="2929467" y="5454930"/>
+            <a:ext cx="5875867" cy="375781"/>
+          </a:xfrm>
+          <a:prstGeom prst="roundRect">
+            <a:avLst/>
+          </a:prstGeom>
+          <a:noFill/>
+          <a:ln>
+            <a:noFill/>
+          </a:ln>
+        </p:spPr>
+        <p:style>
+          <a:lnRef idx="1">
+            <a:schemeClr val="accent6"/>
+          </a:lnRef>
+          <a:fillRef idx="3">
+            <a:schemeClr val="accent6"/>
+          </a:fillRef>
+          <a:effectRef idx="2">
+            <a:schemeClr val="accent6"/>
+          </a:effectRef>
+          <a:fontRef idx="minor">
+            <a:schemeClr val="lt1"/>
+          </a:fontRef>
+        </p:style>
+        <p:txBody>
+          <a:bodyPr rtlCol="0" anchor="ctr"/>
+          <a:lstStyle/>
+          <a:p>
+            <a:pPr algn="ctr"/>
+            <a:r>
+              <a:rPr lang="fr-FR" sz="1600" dirty="0" smtClean="0">
+                <a:solidFill>
+                  <a:schemeClr val="tx1"/>
+                </a:solidFill>
+                <a:latin typeface="Times New Roman" panose="02020603050405020304" pitchFamily="18" charset="0"/>
+                <a:cs typeface="Times New Roman" panose="02020603050405020304" pitchFamily="18" charset="0"/>
+              </a:rPr>
+              <a:t>En prenant en compte de </a:t>
+            </a:r>
+            <a:r>
+              <a:rPr lang="fr-FR" sz="1600" dirty="0" smtClean="0">
+                <a:solidFill>
+                  <a:srgbClr val="FF0000"/>
+                </a:solidFill>
+                <a:latin typeface="Times New Roman" panose="02020603050405020304" pitchFamily="18" charset="0"/>
+                <a:cs typeface="Times New Roman" panose="02020603050405020304" pitchFamily="18" charset="0"/>
+              </a:rPr>
+              <a:t>nombre total des tuyaux:</a:t>
+            </a:r>
+            <a:endParaRPr lang="en-GB" sz="1600" dirty="0">
+              <a:solidFill>
+                <a:srgbClr val="FF0000"/>
+              </a:solidFill>
+              <a:latin typeface="Times New Roman" panose="02020603050405020304" pitchFamily="18" charset="0"/>
+              <a:cs typeface="Times New Roman" panose="02020603050405020304" pitchFamily="18" charset="0"/>
+            </a:endParaRPr>
+          </a:p>
+        </p:txBody>
+      </p:sp>
     </p:spTree>
     <p:extLst>
       <p:ext uri="{BB962C8B-B14F-4D97-AF65-F5344CB8AC3E}">
-        <p14:creationId xmlns:p14="http://schemas.microsoft.com/office/powerpoint/2010/main" val="1133595337"/>
+        <p14:creationId xmlns:p14="http://schemas.microsoft.com/office/powerpoint/2010/main" val="4250813282"/>
       </p:ext>
     </p:extLst>
   </p:cSld>
@@ -7970,7 +8945,7 @@
       </p:grpSpPr>
       <p:pic>
         <p:nvPicPr>
-          <p:cNvPr id="2" name="Image 1" descr="Capture d’écran"/>
+          <p:cNvPr id="5" name="Image 4" descr="Capture d’écran"/>
           <p:cNvPicPr>
             <a:picLocks noChangeAspect="1"/>
           </p:cNvPicPr>
@@ -7991,7 +8966,7 @@
         <p:spPr>
           <a:xfrm>
             <a:off x="0" y="0"/>
-            <a:ext cx="12192000" cy="5607338"/>
+            <a:ext cx="12192000" cy="5753396"/>
           </a:xfrm>
           <a:prstGeom prst="rect">
             <a:avLst/>
@@ -8000,82 +8975,14 @@
       </p:pic>
       <p:sp>
         <p:nvSpPr>
-          <p:cNvPr id="4" name="Rectangle à coins arrondis 3"/>
+          <p:cNvPr id="7" name="Rectangle à coins arrondis 6"/>
           <p:cNvSpPr/>
           <p:nvPr/>
         </p:nvSpPr>
         <p:spPr>
           <a:xfrm>
-            <a:off x="1106905" y="5488795"/>
-            <a:ext cx="9606013" cy="310871"/>
-          </a:xfrm>
-          <a:prstGeom prst="roundRect">
-            <a:avLst/>
-          </a:prstGeom>
-          <a:noFill/>
-          <a:ln>
-            <a:noFill/>
-          </a:ln>
-        </p:spPr>
-        <p:style>
-          <a:lnRef idx="1">
-            <a:schemeClr val="accent6"/>
-          </a:lnRef>
-          <a:fillRef idx="3">
-            <a:schemeClr val="accent6"/>
-          </a:fillRef>
-          <a:effectRef idx="2">
-            <a:schemeClr val="accent6"/>
-          </a:effectRef>
-          <a:fontRef idx="minor">
-            <a:schemeClr val="lt1"/>
-          </a:fontRef>
-        </p:style>
-        <p:txBody>
-          <a:bodyPr rtlCol="0" anchor="ctr"/>
-          <a:lstStyle/>
-          <a:p>
-            <a:pPr algn="ctr"/>
-            <a:r>
-              <a:rPr lang="fr-FR" sz="1600" dirty="0" smtClean="0">
-                <a:solidFill>
-                  <a:schemeClr val="tx1"/>
-                </a:solidFill>
-                <a:latin typeface="Times New Roman" panose="02020603050405020304" pitchFamily="18" charset="0"/>
-                <a:cs typeface="Times New Roman" panose="02020603050405020304" pitchFamily="18" charset="0"/>
-              </a:rPr>
-              <a:t>En prenant en compte de </a:t>
-            </a:r>
-            <a:r>
-              <a:rPr lang="fr-FR" sz="1600" dirty="0" smtClean="0">
-                <a:solidFill>
-                  <a:srgbClr val="FF0000"/>
-                </a:solidFill>
-                <a:latin typeface="Times New Roman" panose="02020603050405020304" pitchFamily="18" charset="0"/>
-                <a:cs typeface="Times New Roman" panose="02020603050405020304" pitchFamily="18" charset="0"/>
-              </a:rPr>
-              <a:t>nombre total des tuyaux (sachant que 151 tuyaux qui ne sont pas pris en compte):</a:t>
-            </a:r>
-            <a:endParaRPr lang="en-GB" sz="1600" dirty="0">
-              <a:solidFill>
-                <a:srgbClr val="FF0000"/>
-              </a:solidFill>
-              <a:latin typeface="Times New Roman" panose="02020603050405020304" pitchFamily="18" charset="0"/>
-              <a:cs typeface="Times New Roman" panose="02020603050405020304" pitchFamily="18" charset="0"/>
-            </a:endParaRPr>
-          </a:p>
-        </p:txBody>
-      </p:sp>
-      <p:sp>
-        <p:nvSpPr>
-          <p:cNvPr id="5" name="Rectangle à coins arrondis 4"/>
-          <p:cNvSpPr/>
-          <p:nvPr/>
-        </p:nvSpPr>
-        <p:spPr>
-          <a:xfrm>
-            <a:off x="152400" y="5830711"/>
-            <a:ext cx="5254978" cy="1027289"/>
+            <a:off x="400755" y="5862348"/>
+            <a:ext cx="11390489" cy="854541"/>
           </a:xfrm>
           <a:prstGeom prst="roundRect">
             <a:avLst/>
@@ -8099,132 +9006,50 @@
           <a:bodyPr rtlCol="0" anchor="ctr"/>
           <a:lstStyle/>
           <a:p>
+            <a:pPr marL="285750" indent="-285750">
+              <a:buFont typeface="Wingdings" panose="05000000000000000000" pitchFamily="2" charset="2"/>
+              <a:buChar char="à"/>
+            </a:pPr>
             <a:r>
               <a:rPr lang="fr-FR" sz="1600" dirty="0" smtClean="0">
                 <a:latin typeface="Times New Roman" panose="02020603050405020304" pitchFamily="18" charset="0"/>
                 <a:cs typeface="Times New Roman" panose="02020603050405020304" pitchFamily="18" charset="0"/>
               </a:rPr>
-              <a:t>Peu fiable:</a:t>
+              <a:t>Collectivité 22 et 13 présentent le plus de casses</a:t>
             </a:r>
           </a:p>
           <a:p>
             <a:pPr marL="285750" indent="-285750">
-              <a:buFontTx/>
-              <a:buChar char="-"/>
+              <a:buFont typeface="Wingdings" panose="05000000000000000000" pitchFamily="2" charset="2"/>
+              <a:buChar char="à"/>
             </a:pPr>
             <a:r>
               <a:rPr lang="fr-FR" sz="1600" dirty="0" smtClean="0">
                 <a:latin typeface="Times New Roman" panose="02020603050405020304" pitchFamily="18" charset="0"/>
                 <a:cs typeface="Times New Roman" panose="02020603050405020304" pitchFamily="18" charset="0"/>
               </a:rPr>
-              <a:t>Acier posé entre 1927-2001, </a:t>
+              <a:t>Dans les collectivités 22 et 13, il y a une grande majorité de FONTEDUCTILE19661980, FONTEGRISE19401970 </a:t>
             </a:r>
           </a:p>
           <a:p>
             <a:pPr marL="285750" indent="-285750">
-              <a:buFontTx/>
-              <a:buChar char="-"/>
+              <a:buFont typeface="Wingdings" panose="05000000000000000000" pitchFamily="2" charset="2"/>
+              <a:buChar char="à"/>
             </a:pPr>
             <a:r>
               <a:rPr lang="fr-FR" sz="1600" dirty="0" smtClean="0">
                 <a:latin typeface="Times New Roman" panose="02020603050405020304" pitchFamily="18" charset="0"/>
                 <a:cs typeface="Times New Roman" panose="02020603050405020304" pitchFamily="18" charset="0"/>
               </a:rPr>
-              <a:t>PEBD posé entre 1956-1984, </a:t>
-            </a:r>
-          </a:p>
-          <a:p>
-            <a:pPr marL="285750" indent="-285750">
-              <a:buFontTx/>
-              <a:buChar char="-"/>
-            </a:pPr>
-            <a:r>
-              <a:rPr lang="fr-FR" sz="1600" dirty="0" smtClean="0">
-                <a:latin typeface="Times New Roman" panose="02020603050405020304" pitchFamily="18" charset="0"/>
-                <a:cs typeface="Times New Roman" panose="02020603050405020304" pitchFamily="18" charset="0"/>
-              </a:rPr>
-              <a:t>FONTEGRISE quelque soit l'année de pose</a:t>
-            </a:r>
-            <a:endParaRPr lang="fr-FR" sz="1600" dirty="0">
-              <a:latin typeface="Times New Roman" panose="02020603050405020304" pitchFamily="18" charset="0"/>
-              <a:cs typeface="Times New Roman" panose="02020603050405020304" pitchFamily="18" charset="0"/>
-            </a:endParaRPr>
-          </a:p>
-        </p:txBody>
-      </p:sp>
-      <p:sp>
-        <p:nvSpPr>
-          <p:cNvPr id="6" name="Rectangle à coins arrondis 5"/>
-          <p:cNvSpPr/>
-          <p:nvPr/>
-        </p:nvSpPr>
-        <p:spPr>
-          <a:xfrm>
-            <a:off x="6214534" y="5799666"/>
-            <a:ext cx="5875867" cy="1078089"/>
-          </a:xfrm>
-          <a:prstGeom prst="roundRect">
-            <a:avLst/>
-          </a:prstGeom>
-        </p:spPr>
-        <p:style>
-          <a:lnRef idx="2">
-            <a:schemeClr val="dk1"/>
-          </a:lnRef>
-          <a:fillRef idx="1">
-            <a:schemeClr val="lt1"/>
-          </a:fillRef>
-          <a:effectRef idx="0">
-            <a:schemeClr val="dk1"/>
-          </a:effectRef>
-          <a:fontRef idx="minor">
-            <a:schemeClr val="dk1"/>
-          </a:fontRef>
-        </p:style>
-        <p:txBody>
-          <a:bodyPr rtlCol="0" anchor="ctr"/>
-          <a:lstStyle/>
-          <a:p>
-            <a:r>
-              <a:rPr lang="fr-FR" sz="1600" dirty="0" smtClean="0">
-                <a:latin typeface="Times New Roman" panose="02020603050405020304" pitchFamily="18" charset="0"/>
-                <a:cs typeface="Times New Roman" panose="02020603050405020304" pitchFamily="18" charset="0"/>
-              </a:rPr>
-              <a:t>Assez fiable:</a:t>
-            </a:r>
-          </a:p>
-          <a:p>
-            <a:endParaRPr lang="fr-FR" sz="1600" dirty="0" smtClean="0">
-              <a:latin typeface="Times New Roman" panose="02020603050405020304" pitchFamily="18" charset="0"/>
-              <a:cs typeface="Times New Roman" panose="02020603050405020304" pitchFamily="18" charset="0"/>
-            </a:endParaRPr>
-          </a:p>
-          <a:p>
-            <a:r>
-              <a:rPr lang="fr-FR" sz="1600" dirty="0" smtClean="0">
-                <a:latin typeface="Times New Roman" panose="02020603050405020304" pitchFamily="18" charset="0"/>
-                <a:cs typeface="Times New Roman" panose="02020603050405020304" pitchFamily="18" charset="0"/>
-              </a:rPr>
-              <a:t>- </a:t>
-            </a:r>
-            <a:r>
-              <a:rPr lang="fr-FR" sz="1600" dirty="0" smtClean="0">
-                <a:latin typeface="Times New Roman" panose="02020603050405020304" pitchFamily="18" charset="0"/>
-                <a:cs typeface="Times New Roman" panose="02020603050405020304" pitchFamily="18" charset="0"/>
-              </a:rPr>
-              <a:t>Plomb (11% des tuyaux posés en 1950).</a:t>
-            </a:r>
-            <a:endParaRPr lang="en-GB" sz="1600" dirty="0">
-              <a:latin typeface="Times New Roman" panose="02020603050405020304" pitchFamily="18" charset="0"/>
-              <a:cs typeface="Times New Roman" panose="02020603050405020304" pitchFamily="18" charset="0"/>
-            </a:endParaRPr>
+              <a:t>Majorité de casses du PVC19701990</a:t>
+            </a:r>
           </a:p>
         </p:txBody>
       </p:sp>
     </p:spTree>
     <p:extLst>
       <p:ext uri="{BB962C8B-B14F-4D97-AF65-F5344CB8AC3E}">
-        <p14:creationId xmlns:p14="http://schemas.microsoft.com/office/powerpoint/2010/main" val="1389165174"/>
+        <p14:creationId xmlns:p14="http://schemas.microsoft.com/office/powerpoint/2010/main" val="4217171424"/>
       </p:ext>
     </p:extLst>
   </p:cSld>

</xml_diff>